<commit_message>
Atualizado PPT e demos do Kafka
</commit_message>
<xml_diff>
--- a/2021-08-25_event-driven-architecture.pptx
+++ b/2021-08-25_event-driven-architecture.pptx
@@ -5,7 +5,7 @@
     <p:sldMasterId id="2147483648" r:id="rId1"/>
   </p:sldMasterIdLst>
   <p:notesMasterIdLst>
-    <p:notesMasterId r:id="rId40"/>
+    <p:notesMasterId r:id="rId42"/>
   </p:notesMasterIdLst>
   <p:sldIdLst>
     <p:sldId id="260" r:id="rId2"/>
@@ -45,7 +45,9 @@
     <p:sldId id="511" r:id="rId36"/>
     <p:sldId id="512" r:id="rId37"/>
     <p:sldId id="509" r:id="rId38"/>
-    <p:sldId id="265" r:id="rId39"/>
+    <p:sldId id="514" r:id="rId39"/>
+    <p:sldId id="513" r:id="rId40"/>
+    <p:sldId id="265" r:id="rId41"/>
   </p:sldIdLst>
   <p:sldSz cx="12192000" cy="6858000"/>
   <p:notesSz cx="6858000" cy="9144000"/>
@@ -3750,7 +3752,7 @@
           <a:p>
             <a:fld id="{2232590A-2ECD-4930-A16F-BAB4FCA317C7}" type="datetimeFigureOut">
               <a:rPr lang="pt-BR" smtClean="0"/>
-              <a:t>24/08/2021</a:t>
+              <a:t>25/08/2021</a:t>
             </a:fld>
             <a:endParaRPr lang="pt-BR"/>
           </a:p>
@@ -4445,6 +4447,306 @@
 </p:notes>
 </file>
 
+<file path=ppt/notesSlides/notesSlide12.xml><?xml version="1.0" encoding="utf-8"?>
+<p:notes xmlns:a="http://schemas.openxmlformats.org/drawingml/2006/main" xmlns:r="http://schemas.openxmlformats.org/officeDocument/2006/relationships" xmlns:p="http://schemas.openxmlformats.org/presentationml/2006/main">
+  <p:cSld>
+    <p:spTree>
+      <p:nvGrpSpPr>
+        <p:cNvPr id="1" name=""/>
+        <p:cNvGrpSpPr/>
+        <p:nvPr/>
+      </p:nvGrpSpPr>
+      <p:grpSpPr>
+        <a:xfrm>
+          <a:off x="0" y="0"/>
+          <a:ext cx="0" cy="0"/>
+          <a:chOff x="0" y="0"/>
+          <a:chExt cx="0" cy="0"/>
+        </a:xfrm>
+      </p:grpSpPr>
+      <p:sp>
+        <p:nvSpPr>
+          <p:cNvPr id="2" name="Espaço Reservado para Imagem de Slide 1"/>
+          <p:cNvSpPr>
+            <a:spLocks noGrp="1" noRot="1" noChangeAspect="1"/>
+          </p:cNvSpPr>
+          <p:nvPr>
+            <p:ph type="sldImg"/>
+          </p:nvPr>
+        </p:nvSpPr>
+        <p:spPr/>
+      </p:sp>
+      <p:sp>
+        <p:nvSpPr>
+          <p:cNvPr id="3" name="Espaço Reservado para Anotações 2"/>
+          <p:cNvSpPr>
+            <a:spLocks noGrp="1"/>
+          </p:cNvSpPr>
+          <p:nvPr>
+            <p:ph type="body" idx="1"/>
+          </p:nvPr>
+        </p:nvSpPr>
+        <p:spPr/>
+        <p:txBody>
+          <a:bodyPr/>
+          <a:lstStyle/>
+          <a:p>
+            <a:r>
+              <a:rPr lang="en-US" dirty="0"/>
+              <a:t>Delete: Seta um valor </a:t>
+            </a:r>
+            <a:r>
+              <a:rPr lang="en-US" dirty="0" err="1"/>
+              <a:t>máximo</a:t>
+            </a:r>
+            <a:r>
+              <a:rPr lang="en-US" dirty="0"/>
+              <a:t> (Bytes) para o </a:t>
+            </a:r>
+            <a:r>
+              <a:rPr lang="en-US" dirty="0" err="1"/>
+              <a:t>tópico</a:t>
+            </a:r>
+            <a:r>
+              <a:rPr lang="en-US" dirty="0"/>
+              <a:t> e </a:t>
+            </a:r>
+            <a:r>
+              <a:rPr lang="en-US" dirty="0" err="1"/>
+              <a:t>vai</a:t>
+            </a:r>
+            <a:r>
+              <a:rPr lang="en-US" dirty="0"/>
+              <a:t> </a:t>
+            </a:r>
+            <a:r>
+              <a:rPr lang="en-US" dirty="0" err="1"/>
+              <a:t>deletando</a:t>
+            </a:r>
+            <a:r>
+              <a:rPr lang="en-US" dirty="0"/>
+              <a:t> as </a:t>
+            </a:r>
+            <a:r>
+              <a:rPr lang="en-US" dirty="0" err="1"/>
+              <a:t>mensagens</a:t>
+            </a:r>
+            <a:r>
+              <a:rPr lang="en-US" dirty="0"/>
+              <a:t> </a:t>
+            </a:r>
+            <a:r>
+              <a:rPr lang="en-US" dirty="0" err="1"/>
+              <a:t>antigas</a:t>
+            </a:r>
+            <a:r>
+              <a:rPr lang="pt-BR" dirty="0"/>
+              <a:t>. Ou por um determinado tempo.</a:t>
+            </a:r>
+          </a:p>
+          <a:p>
+            <a:r>
+              <a:rPr lang="pt-BR" dirty="0" err="1"/>
+              <a:t>Compaction</a:t>
+            </a:r>
+            <a:r>
+              <a:rPr lang="pt-BR" dirty="0"/>
+              <a:t> = </a:t>
+            </a:r>
+            <a:r>
+              <a:rPr lang="pt-BR" dirty="0" err="1"/>
+              <a:t>Upsert</a:t>
+            </a:r>
+            <a:endParaRPr lang="en-US" dirty="0"/>
+          </a:p>
+        </p:txBody>
+      </p:sp>
+      <p:sp>
+        <p:nvSpPr>
+          <p:cNvPr id="4" name="Espaço Reservado para Número de Slide 3"/>
+          <p:cNvSpPr>
+            <a:spLocks noGrp="1"/>
+          </p:cNvSpPr>
+          <p:nvPr>
+            <p:ph type="sldNum" sz="quarter" idx="5"/>
+          </p:nvPr>
+        </p:nvSpPr>
+        <p:spPr/>
+        <p:txBody>
+          <a:bodyPr/>
+          <a:lstStyle/>
+          <a:p>
+            <a:fld id="{1BFBF4EA-A19C-4108-A664-D5EED1568F94}" type="slidenum">
+              <a:rPr lang="pt-BR" smtClean="0"/>
+              <a:t>37</a:t>
+            </a:fld>
+            <a:endParaRPr lang="pt-BR"/>
+          </a:p>
+        </p:txBody>
+      </p:sp>
+    </p:spTree>
+    <p:extLst>
+      <p:ext uri="{BB962C8B-B14F-4D97-AF65-F5344CB8AC3E}">
+        <p14:creationId xmlns:p14="http://schemas.microsoft.com/office/powerpoint/2010/main" val="2008148462"/>
+      </p:ext>
+    </p:extLst>
+  </p:cSld>
+  <p:clrMapOvr>
+    <a:masterClrMapping/>
+  </p:clrMapOvr>
+</p:notes>
+</file>
+
+<file path=ppt/notesSlides/notesSlide13.xml><?xml version="1.0" encoding="utf-8"?>
+<p:notes xmlns:a="http://schemas.openxmlformats.org/drawingml/2006/main" xmlns:r="http://schemas.openxmlformats.org/officeDocument/2006/relationships" xmlns:p="http://schemas.openxmlformats.org/presentationml/2006/main">
+  <p:cSld>
+    <p:spTree>
+      <p:nvGrpSpPr>
+        <p:cNvPr id="1" name=""/>
+        <p:cNvGrpSpPr/>
+        <p:nvPr/>
+      </p:nvGrpSpPr>
+      <p:grpSpPr>
+        <a:xfrm>
+          <a:off x="0" y="0"/>
+          <a:ext cx="0" cy="0"/>
+          <a:chOff x="0" y="0"/>
+          <a:chExt cx="0" cy="0"/>
+        </a:xfrm>
+      </p:grpSpPr>
+      <p:sp>
+        <p:nvSpPr>
+          <p:cNvPr id="2" name="Espaço Reservado para Imagem de Slide 1"/>
+          <p:cNvSpPr>
+            <a:spLocks noGrp="1" noRot="1" noChangeAspect="1"/>
+          </p:cNvSpPr>
+          <p:nvPr>
+            <p:ph type="sldImg"/>
+          </p:nvPr>
+        </p:nvSpPr>
+        <p:spPr/>
+      </p:sp>
+      <p:sp>
+        <p:nvSpPr>
+          <p:cNvPr id="3" name="Espaço Reservado para Anotações 2"/>
+          <p:cNvSpPr>
+            <a:spLocks noGrp="1"/>
+          </p:cNvSpPr>
+          <p:nvPr>
+            <p:ph type="body" idx="1"/>
+          </p:nvPr>
+        </p:nvSpPr>
+        <p:spPr/>
+        <p:txBody>
+          <a:bodyPr/>
+          <a:lstStyle/>
+          <a:p>
+            <a:r>
+              <a:rPr lang="en-US" dirty="0"/>
+              <a:t>Delete: Seta um valor </a:t>
+            </a:r>
+            <a:r>
+              <a:rPr lang="en-US" dirty="0" err="1"/>
+              <a:t>máximo</a:t>
+            </a:r>
+            <a:r>
+              <a:rPr lang="en-US" dirty="0"/>
+              <a:t> (Bytes) para o </a:t>
+            </a:r>
+            <a:r>
+              <a:rPr lang="en-US" dirty="0" err="1"/>
+              <a:t>tópico</a:t>
+            </a:r>
+            <a:r>
+              <a:rPr lang="en-US" dirty="0"/>
+              <a:t> e </a:t>
+            </a:r>
+            <a:r>
+              <a:rPr lang="en-US" dirty="0" err="1"/>
+              <a:t>vai</a:t>
+            </a:r>
+            <a:r>
+              <a:rPr lang="en-US" dirty="0"/>
+              <a:t> </a:t>
+            </a:r>
+            <a:r>
+              <a:rPr lang="en-US" dirty="0" err="1"/>
+              <a:t>deletando</a:t>
+            </a:r>
+            <a:r>
+              <a:rPr lang="en-US" dirty="0"/>
+              <a:t> as </a:t>
+            </a:r>
+            <a:r>
+              <a:rPr lang="en-US" dirty="0" err="1"/>
+              <a:t>mensagens</a:t>
+            </a:r>
+            <a:r>
+              <a:rPr lang="en-US" dirty="0"/>
+              <a:t> </a:t>
+            </a:r>
+            <a:r>
+              <a:rPr lang="en-US" dirty="0" err="1"/>
+              <a:t>antigas</a:t>
+            </a:r>
+            <a:r>
+              <a:rPr lang="pt-BR" dirty="0"/>
+              <a:t>. Ou por um determinado tempo.</a:t>
+            </a:r>
+          </a:p>
+          <a:p>
+            <a:r>
+              <a:rPr lang="pt-BR" dirty="0" err="1"/>
+              <a:t>Compaction</a:t>
+            </a:r>
+            <a:r>
+              <a:rPr lang="pt-BR" dirty="0"/>
+              <a:t> = </a:t>
+            </a:r>
+            <a:r>
+              <a:rPr lang="pt-BR" dirty="0" err="1"/>
+              <a:t>Upsert</a:t>
+            </a:r>
+            <a:endParaRPr lang="en-US" dirty="0"/>
+          </a:p>
+        </p:txBody>
+      </p:sp>
+      <p:sp>
+        <p:nvSpPr>
+          <p:cNvPr id="4" name="Espaço Reservado para Número de Slide 3"/>
+          <p:cNvSpPr>
+            <a:spLocks noGrp="1"/>
+          </p:cNvSpPr>
+          <p:nvPr>
+            <p:ph type="sldNum" sz="quarter" idx="5"/>
+          </p:nvPr>
+        </p:nvSpPr>
+        <p:spPr/>
+        <p:txBody>
+          <a:bodyPr/>
+          <a:lstStyle/>
+          <a:p>
+            <a:fld id="{1BFBF4EA-A19C-4108-A664-D5EED1568F94}" type="slidenum">
+              <a:rPr lang="pt-BR" smtClean="0"/>
+              <a:t>38</a:t>
+            </a:fld>
+            <a:endParaRPr lang="pt-BR"/>
+          </a:p>
+        </p:txBody>
+      </p:sp>
+    </p:spTree>
+    <p:extLst>
+      <p:ext uri="{BB962C8B-B14F-4D97-AF65-F5344CB8AC3E}">
+        <p14:creationId xmlns:p14="http://schemas.microsoft.com/office/powerpoint/2010/main" val="1894365384"/>
+      </p:ext>
+    </p:extLst>
+  </p:cSld>
+  <p:clrMapOvr>
+    <a:masterClrMapping/>
+  </p:clrMapOvr>
+</p:notes>
+</file>
+
 <file path=ppt/notesSlides/notesSlide2.xml><?xml version="1.0" encoding="utf-8"?>
 <p:notes xmlns:a="http://schemas.openxmlformats.org/drawingml/2006/main" xmlns:r="http://schemas.openxmlformats.org/officeDocument/2006/relationships" xmlns:p="http://schemas.openxmlformats.org/presentationml/2006/main">
   <p:cSld>
@@ -5438,7 +5740,7 @@
           <a:p>
             <a:fld id="{358D75C1-F3B0-4D81-A190-EFDBB1D1AFEE}" type="datetimeFigureOut">
               <a:rPr lang="pt-BR" smtClean="0"/>
-              <a:t>24/08/2021</a:t>
+              <a:t>25/08/2021</a:t>
             </a:fld>
             <a:endParaRPr lang="pt-BR"/>
           </a:p>
@@ -5636,7 +5938,7 @@
           <a:p>
             <a:fld id="{358D75C1-F3B0-4D81-A190-EFDBB1D1AFEE}" type="datetimeFigureOut">
               <a:rPr lang="pt-BR" smtClean="0"/>
-              <a:t>24/08/2021</a:t>
+              <a:t>25/08/2021</a:t>
             </a:fld>
             <a:endParaRPr lang="pt-BR"/>
           </a:p>
@@ -5844,7 +6146,7 @@
           <a:p>
             <a:fld id="{358D75C1-F3B0-4D81-A190-EFDBB1D1AFEE}" type="datetimeFigureOut">
               <a:rPr lang="pt-BR" smtClean="0"/>
-              <a:t>24/08/2021</a:t>
+              <a:t>25/08/2021</a:t>
             </a:fld>
             <a:endParaRPr lang="pt-BR"/>
           </a:p>
@@ -6042,7 +6344,7 @@
           <a:p>
             <a:fld id="{358D75C1-F3B0-4D81-A190-EFDBB1D1AFEE}" type="datetimeFigureOut">
               <a:rPr lang="pt-BR" smtClean="0"/>
-              <a:t>24/08/2021</a:t>
+              <a:t>25/08/2021</a:t>
             </a:fld>
             <a:endParaRPr lang="pt-BR"/>
           </a:p>
@@ -6317,7 +6619,7 @@
           <a:p>
             <a:fld id="{358D75C1-F3B0-4D81-A190-EFDBB1D1AFEE}" type="datetimeFigureOut">
               <a:rPr lang="pt-BR" smtClean="0"/>
-              <a:t>24/08/2021</a:t>
+              <a:t>25/08/2021</a:t>
             </a:fld>
             <a:endParaRPr lang="pt-BR"/>
           </a:p>
@@ -6582,7 +6884,7 @@
           <a:p>
             <a:fld id="{358D75C1-F3B0-4D81-A190-EFDBB1D1AFEE}" type="datetimeFigureOut">
               <a:rPr lang="pt-BR" smtClean="0"/>
-              <a:t>24/08/2021</a:t>
+              <a:t>25/08/2021</a:t>
             </a:fld>
             <a:endParaRPr lang="pt-BR"/>
           </a:p>
@@ -6994,7 +7296,7 @@
           <a:p>
             <a:fld id="{358D75C1-F3B0-4D81-A190-EFDBB1D1AFEE}" type="datetimeFigureOut">
               <a:rPr lang="pt-BR" smtClean="0"/>
-              <a:t>24/08/2021</a:t>
+              <a:t>25/08/2021</a:t>
             </a:fld>
             <a:endParaRPr lang="pt-BR"/>
           </a:p>
@@ -7135,7 +7437,7 @@
           <a:p>
             <a:fld id="{358D75C1-F3B0-4D81-A190-EFDBB1D1AFEE}" type="datetimeFigureOut">
               <a:rPr lang="pt-BR" smtClean="0"/>
-              <a:t>24/08/2021</a:t>
+              <a:t>25/08/2021</a:t>
             </a:fld>
             <a:endParaRPr lang="pt-BR"/>
           </a:p>
@@ -7248,7 +7550,7 @@
           <a:p>
             <a:fld id="{358D75C1-F3B0-4D81-A190-EFDBB1D1AFEE}" type="datetimeFigureOut">
               <a:rPr lang="pt-BR" smtClean="0"/>
-              <a:t>24/08/2021</a:t>
+              <a:t>25/08/2021</a:t>
             </a:fld>
             <a:endParaRPr lang="pt-BR"/>
           </a:p>
@@ -7559,7 +7861,7 @@
           <a:p>
             <a:fld id="{358D75C1-F3B0-4D81-A190-EFDBB1D1AFEE}" type="datetimeFigureOut">
               <a:rPr lang="pt-BR" smtClean="0"/>
-              <a:t>24/08/2021</a:t>
+              <a:t>25/08/2021</a:t>
             </a:fld>
             <a:endParaRPr lang="pt-BR"/>
           </a:p>
@@ -7847,7 +8149,7 @@
           <a:p>
             <a:fld id="{358D75C1-F3B0-4D81-A190-EFDBB1D1AFEE}" type="datetimeFigureOut">
               <a:rPr lang="pt-BR" smtClean="0"/>
-              <a:t>24/08/2021</a:t>
+              <a:t>25/08/2021</a:t>
             </a:fld>
             <a:endParaRPr lang="pt-BR"/>
           </a:p>
@@ -8088,7 +8390,7 @@
           <a:p>
             <a:fld id="{358D75C1-F3B0-4D81-A190-EFDBB1D1AFEE}" type="datetimeFigureOut">
               <a:rPr lang="pt-BR" smtClean="0"/>
-              <a:t>24/08/2021</a:t>
+              <a:t>25/08/2021</a:t>
             </a:fld>
             <a:endParaRPr lang="pt-BR"/>
           </a:p>
@@ -25370,7 +25672,7 @@
             </a:pPr>
             <a:r>
               <a:rPr lang="pt-BR" dirty="0">
-                <a:latin typeface="Montserrat Light" panose="00000400000000000000" pitchFamily="2" charset="0"/>
+                <a:latin typeface="Nunito" pitchFamily="2" charset="0"/>
               </a:rPr>
               <a:t>Recebe, armazena e transmite as mensagens</a:t>
             </a:r>
@@ -25382,18 +25684,18 @@
             </a:pPr>
             <a:r>
               <a:rPr lang="pt-BR" dirty="0">
-                <a:latin typeface="Montserrat Light" panose="00000400000000000000" pitchFamily="2" charset="0"/>
+                <a:latin typeface="Nunito" pitchFamily="2" charset="0"/>
               </a:rPr>
               <a:t>Funciona em conjunto com o </a:t>
             </a:r>
             <a:r>
               <a:rPr lang="pt-BR" dirty="0" err="1">
-                <a:latin typeface="Montserrat Light" panose="00000400000000000000" pitchFamily="2" charset="0"/>
+                <a:latin typeface="Nunito" pitchFamily="2" charset="0"/>
               </a:rPr>
               <a:t>Zookeeper</a:t>
             </a:r>
             <a:endParaRPr lang="pt-BR" dirty="0">
-              <a:latin typeface="Montserrat Light" panose="00000400000000000000" pitchFamily="2" charset="0"/>
+              <a:latin typeface="Nunito" pitchFamily="2" charset="0"/>
             </a:endParaRPr>
           </a:p>
           <a:p>
@@ -25403,7 +25705,7 @@
             </a:pPr>
             <a:r>
               <a:rPr lang="pt-BR" dirty="0">
-                <a:latin typeface="Montserrat Light" panose="00000400000000000000" pitchFamily="2" charset="0"/>
+                <a:latin typeface="Nunito" pitchFamily="2" charset="0"/>
               </a:rPr>
               <a:t>Deve ficar em um espaço dedicado</a:t>
             </a:r>
@@ -25415,7 +25717,7 @@
             </a:pPr>
             <a:r>
               <a:rPr lang="pt-BR" dirty="0">
-                <a:latin typeface="Montserrat Light" panose="00000400000000000000" pitchFamily="2" charset="0"/>
+                <a:latin typeface="Nunito" pitchFamily="2" charset="0"/>
               </a:rPr>
               <a:t>Servidor dedicado, recursos dedicados</a:t>
             </a:r>
@@ -25427,7 +25729,7 @@
             </a:pPr>
             <a:r>
               <a:rPr lang="pt-BR" dirty="0">
-                <a:latin typeface="Montserrat Light" panose="00000400000000000000" pitchFamily="2" charset="0"/>
+                <a:latin typeface="Nunito" pitchFamily="2" charset="0"/>
               </a:rPr>
               <a:t>Tem um alto nível de I/O</a:t>
             </a:r>
@@ -25439,7 +25741,7 @@
             </a:pPr>
             <a:r>
               <a:rPr lang="pt-BR" dirty="0">
-                <a:latin typeface="Montserrat Light" panose="00000400000000000000" pitchFamily="2" charset="0"/>
+                <a:latin typeface="Nunito" pitchFamily="2" charset="0"/>
               </a:rPr>
               <a:t>Pode afetar todo o resto</a:t>
             </a:r>
@@ -25451,7 +25753,7 @@
             </a:pPr>
             <a:r>
               <a:rPr lang="pt-BR" dirty="0">
-                <a:latin typeface="Montserrat Light" panose="00000400000000000000" pitchFamily="2" charset="0"/>
+                <a:latin typeface="Nunito" pitchFamily="2" charset="0"/>
               </a:rPr>
               <a:t>Processo que roda no topo do OS</a:t>
             </a:r>
@@ -25463,7 +25765,7 @@
             </a:pPr>
             <a:r>
               <a:rPr lang="pt-BR" dirty="0">
-                <a:latin typeface="Montserrat Light" panose="00000400000000000000" pitchFamily="2" charset="0"/>
+                <a:latin typeface="Nunito" pitchFamily="2" charset="0"/>
               </a:rPr>
               <a:t>Basicamente armazena e lê mensagens</a:t>
             </a:r>
@@ -25475,7 +25777,7 @@
             </a:pPr>
             <a:r>
               <a:rPr lang="pt-BR" dirty="0">
-                <a:latin typeface="Montserrat Light" panose="00000400000000000000" pitchFamily="2" charset="0"/>
+                <a:latin typeface="Nunito" pitchFamily="2" charset="0"/>
               </a:rPr>
               <a:t>Tudo binário</a:t>
             </a:r>
@@ -25487,7 +25789,7 @@
             </a:pPr>
             <a:r>
               <a:rPr lang="pt-BR" dirty="0">
-                <a:latin typeface="Montserrat Light" panose="00000400000000000000" pitchFamily="2" charset="0"/>
+                <a:latin typeface="Nunito" pitchFamily="2" charset="0"/>
               </a:rPr>
               <a:t>Provavelmente vai rodar em um cluster</a:t>
             </a:r>
@@ -25499,7 +25801,7 @@
             </a:pPr>
             <a:r>
               <a:rPr lang="pt-BR" dirty="0">
-                <a:latin typeface="Montserrat Light" panose="00000400000000000000" pitchFamily="2" charset="0"/>
+                <a:latin typeface="Nunito" pitchFamily="2" charset="0"/>
               </a:rPr>
               <a:t>Cluster = Conjunto de servidores</a:t>
             </a:r>
@@ -25825,7 +26127,7 @@
             </a:pPr>
             <a:r>
               <a:rPr lang="pt-BR" dirty="0">
-                <a:latin typeface="Montserrat Light" panose="00000400000000000000" pitchFamily="2" charset="0"/>
+                <a:latin typeface="Nunito" pitchFamily="2" charset="0"/>
               </a:rPr>
               <a:t>Faz o “meio-campo” entre os brokers</a:t>
             </a:r>
@@ -25837,31 +26139,31 @@
             </a:pPr>
             <a:r>
               <a:rPr lang="pt-BR" dirty="0">
-                <a:latin typeface="Montserrat Light" panose="00000400000000000000" pitchFamily="2" charset="0"/>
+                <a:latin typeface="Nunito" pitchFamily="2" charset="0"/>
               </a:rPr>
               <a:t>Funciona como um “</a:t>
             </a:r>
             <a:r>
               <a:rPr lang="pt-BR" dirty="0" err="1">
-                <a:latin typeface="Montserrat Light" panose="00000400000000000000" pitchFamily="2" charset="0"/>
+                <a:latin typeface="Nunito" pitchFamily="2" charset="0"/>
               </a:rPr>
               <a:t>load</a:t>
             </a:r>
             <a:r>
               <a:rPr lang="pt-BR" dirty="0">
-                <a:latin typeface="Montserrat Light" panose="00000400000000000000" pitchFamily="2" charset="0"/>
+                <a:latin typeface="Nunito" pitchFamily="2" charset="0"/>
               </a:rPr>
               <a:t> </a:t>
             </a:r>
             <a:r>
               <a:rPr lang="pt-BR" dirty="0" err="1">
-                <a:latin typeface="Montserrat Light" panose="00000400000000000000" pitchFamily="2" charset="0"/>
+                <a:latin typeface="Nunito" pitchFamily="2" charset="0"/>
               </a:rPr>
               <a:t>balancer</a:t>
             </a:r>
             <a:r>
               <a:rPr lang="pt-BR" dirty="0">
-                <a:latin typeface="Montserrat Light" panose="00000400000000000000" pitchFamily="2" charset="0"/>
+                <a:latin typeface="Nunito" pitchFamily="2" charset="0"/>
               </a:rPr>
               <a:t>”</a:t>
             </a:r>
@@ -25873,7 +26175,7 @@
             </a:pPr>
             <a:r>
               <a:rPr lang="pt-BR" dirty="0">
-                <a:latin typeface="Montserrat Light" panose="00000400000000000000" pitchFamily="2" charset="0"/>
+                <a:latin typeface="Nunito" pitchFamily="2" charset="0"/>
               </a:rPr>
               <a:t>Gerencia falhas nos brokers</a:t>
             </a:r>
@@ -26479,7 +26781,7 @@
           <p:nvPr/>
         </p:nvPicPr>
         <p:blipFill>
-          <a:blip r:embed="rId2">
+          <a:blip r:embed="rId3">
             <a:extLst>
               <a:ext uri="{28A0092B-C50C-407E-A947-70E740481C1C}">
                 <a14:useLocalDpi xmlns:a14="http://schemas.microsoft.com/office/drawing/2010/main" val="0"/>
@@ -26535,8 +26837,41 @@
                 </a:solidFill>
                 <a:latin typeface="Nunito" pitchFamily="2" charset="77"/>
               </a:rPr>
-              <a:t>Streaming</a:t>
-            </a:r>
+              <a:t>Records, </a:t>
+            </a:r>
+            <a:r>
+              <a:rPr lang="pt-BR" dirty="0" err="1">
+                <a:solidFill>
+                  <a:schemeClr val="bg1"/>
+                </a:solidFill>
+                <a:latin typeface="Nunito" pitchFamily="2" charset="77"/>
+              </a:rPr>
+              <a:t>Topics</a:t>
+            </a:r>
+            <a:r>
+              <a:rPr lang="pt-BR" dirty="0">
+                <a:solidFill>
+                  <a:schemeClr val="bg1"/>
+                </a:solidFill>
+                <a:latin typeface="Nunito" pitchFamily="2" charset="77"/>
+              </a:rPr>
+              <a:t> e </a:t>
+            </a:r>
+            <a:r>
+              <a:rPr lang="pt-BR" dirty="0" err="1">
+                <a:solidFill>
+                  <a:schemeClr val="bg1"/>
+                </a:solidFill>
+                <a:latin typeface="Nunito" pitchFamily="2" charset="77"/>
+              </a:rPr>
+              <a:t>Partitions</a:t>
+            </a:r>
+            <a:endParaRPr lang="pt-BR" dirty="0">
+              <a:solidFill>
+                <a:schemeClr val="bg1"/>
+              </a:solidFill>
+              <a:latin typeface="Nunito" pitchFamily="2" charset="77"/>
+            </a:endParaRPr>
           </a:p>
         </p:txBody>
       </p:sp>
@@ -26555,10 +26890,10 @@
           <p:nvPr/>
         </p:nvPicPr>
         <p:blipFill>
-          <a:blip r:embed="rId3">
+          <a:blip r:embed="rId4">
             <a:extLst>
               <a:ext uri="{96DAC541-7B7A-43D3-8B79-37D633B846F1}">
-                <asvg:svgBlip xmlns:asvg="http://schemas.microsoft.com/office/drawing/2016/SVG/main" r:embed="rId4"/>
+                <asvg:svgBlip xmlns:asvg="http://schemas.microsoft.com/office/drawing/2016/SVG/main" r:embed="rId5"/>
               </a:ext>
             </a:extLst>
           </a:blip>
@@ -26591,7 +26926,7 @@
         <p:spPr>
           <a:xfrm>
             <a:off x="1097280" y="2719343"/>
-            <a:ext cx="6400800" cy="2585323"/>
+            <a:ext cx="6400800" cy="4524315"/>
           </a:xfrm>
           <a:prstGeom prst="rect">
             <a:avLst/>
@@ -26608,7 +26943,7 @@
               <a:rPr lang="pt-BR" b="1" dirty="0">
                 <a:latin typeface="Nunito" pitchFamily="2" charset="77"/>
               </a:rPr>
-              <a:t>Mensagem</a:t>
+              <a:t>Record</a:t>
             </a:r>
           </a:p>
           <a:p>
@@ -26620,101 +26955,8 @@
               <a:rPr lang="en-US" dirty="0">
                 <a:latin typeface="Nunito" pitchFamily="2" charset="77"/>
               </a:rPr>
-              <a:t>É o </a:t>
-            </a:r>
-            <a:r>
-              <a:rPr lang="en-US" dirty="0" err="1">
-                <a:latin typeface="Nunito" pitchFamily="2" charset="77"/>
-              </a:rPr>
-              <a:t>ato</a:t>
-            </a:r>
-            <a:r>
-              <a:rPr lang="en-US" dirty="0">
-                <a:latin typeface="Nunito" pitchFamily="2" charset="77"/>
-              </a:rPr>
-              <a:t> de </a:t>
-            </a:r>
-            <a:r>
-              <a:rPr lang="en-US" dirty="0" err="1">
-                <a:latin typeface="Nunito" pitchFamily="2" charset="77"/>
-              </a:rPr>
-              <a:t>processar</a:t>
-            </a:r>
-            <a:r>
-              <a:rPr lang="en-US" dirty="0">
-                <a:latin typeface="Nunito" pitchFamily="2" charset="77"/>
-              </a:rPr>
-              <a:t> </a:t>
-            </a:r>
-            <a:r>
-              <a:rPr lang="en-US" dirty="0" err="1">
-                <a:latin typeface="Nunito" pitchFamily="2" charset="77"/>
-              </a:rPr>
-              <a:t>os</a:t>
-            </a:r>
-            <a:r>
-              <a:rPr lang="en-US" dirty="0">
-                <a:latin typeface="Nunito" pitchFamily="2" charset="77"/>
-              </a:rPr>
-              <a:t> </a:t>
-            </a:r>
-            <a:r>
-              <a:rPr lang="en-US" dirty="0" err="1">
-                <a:latin typeface="Nunito" pitchFamily="2" charset="77"/>
-              </a:rPr>
-              <a:t>eventos</a:t>
-            </a:r>
-            <a:r>
-              <a:rPr lang="en-US" dirty="0">
-                <a:latin typeface="Nunito" pitchFamily="2" charset="77"/>
-              </a:rPr>
-              <a:t>, um a um, </a:t>
-            </a:r>
-            <a:r>
-              <a:rPr lang="en-US" dirty="0" err="1">
-                <a:latin typeface="Nunito" pitchFamily="2" charset="77"/>
-              </a:rPr>
-              <a:t>na</a:t>
-            </a:r>
-            <a:r>
-              <a:rPr lang="en-US" dirty="0">
-                <a:latin typeface="Nunito" pitchFamily="2" charset="77"/>
-              </a:rPr>
-              <a:t> </a:t>
-            </a:r>
-            <a:r>
-              <a:rPr lang="en-US" dirty="0" err="1">
-                <a:latin typeface="Nunito" pitchFamily="2" charset="77"/>
-              </a:rPr>
-              <a:t>ordem</a:t>
-            </a:r>
-            <a:r>
-              <a:rPr lang="en-US" dirty="0">
-                <a:latin typeface="Nunito" pitchFamily="2" charset="77"/>
-              </a:rPr>
-              <a:t> que </a:t>
-            </a:r>
-            <a:r>
-              <a:rPr lang="en-US" dirty="0" err="1">
-                <a:latin typeface="Nunito" pitchFamily="2" charset="77"/>
-              </a:rPr>
-              <a:t>chegam</a:t>
-            </a:r>
-            <a:r>
-              <a:rPr lang="en-US" dirty="0">
-                <a:latin typeface="Nunito" pitchFamily="2" charset="77"/>
-              </a:rPr>
-              <a:t> no </a:t>
-            </a:r>
-            <a:r>
-              <a:rPr lang="en-US" dirty="0" err="1">
-                <a:latin typeface="Nunito" pitchFamily="2" charset="77"/>
-              </a:rPr>
-              <a:t>sistema</a:t>
-            </a:r>
-            <a:endParaRPr lang="en-US" dirty="0">
-              <a:latin typeface="Nunito" pitchFamily="2" charset="77"/>
-            </a:endParaRPr>
+              <a:t>Key, Value, Timestamp</a:t>
+            </a:r>
           </a:p>
           <a:p>
             <a:pPr marL="742950" lvl="1" indent="-285750">
@@ -26722,17 +26964,43 @@
               <a:buChar char="-"/>
             </a:pPr>
             <a:r>
+              <a:rPr lang="en-US" dirty="0">
+                <a:latin typeface="Nunito" pitchFamily="2" charset="77"/>
+              </a:rPr>
+              <a:t>Key e Value = </a:t>
+            </a:r>
+            <a:r>
               <a:rPr lang="en-US" dirty="0" err="1">
                 <a:latin typeface="Nunito" pitchFamily="2" charset="77"/>
               </a:rPr>
-              <a:t>Igual</a:t>
+              <a:t>Qualquer</a:t>
             </a:r>
             <a:r>
               <a:rPr lang="en-US" dirty="0">
                 <a:latin typeface="Nunito" pitchFamily="2" charset="77"/>
               </a:rPr>
-              <a:t> um streaming de video</a:t>
-            </a:r>
+              <a:t> </a:t>
+            </a:r>
+            <a:r>
+              <a:rPr lang="en-US" dirty="0" err="1">
+                <a:latin typeface="Nunito" pitchFamily="2" charset="77"/>
+              </a:rPr>
+              <a:t>coisa</a:t>
+            </a:r>
+            <a:endParaRPr lang="en-US" dirty="0">
+              <a:latin typeface="Nunito" pitchFamily="2" charset="77"/>
+            </a:endParaRPr>
+          </a:p>
+          <a:p>
+            <a:r>
+              <a:rPr lang="pt-BR" b="1" dirty="0" err="1">
+                <a:latin typeface="Nunito" pitchFamily="2" charset="77"/>
+              </a:rPr>
+              <a:t>Topic</a:t>
+            </a:r>
+            <a:endParaRPr lang="pt-BR" b="1" dirty="0">
+              <a:latin typeface="Nunito" pitchFamily="2" charset="77"/>
+            </a:endParaRPr>
           </a:p>
           <a:p>
             <a:pPr marL="285750" indent="-285750">
@@ -26743,62 +27011,304 @@
               <a:rPr lang="en-US" dirty="0" err="1">
                 <a:latin typeface="Nunito" pitchFamily="2" charset="77"/>
               </a:rPr>
-              <a:t>Processar</a:t>
+              <a:t>Categoria</a:t>
             </a:r>
             <a:r>
               <a:rPr lang="en-US" dirty="0">
                 <a:latin typeface="Nunito" pitchFamily="2" charset="77"/>
               </a:rPr>
-              <a:t> as </a:t>
+              <a:t> de um </a:t>
             </a:r>
             <a:r>
               <a:rPr lang="en-US" dirty="0" err="1">
                 <a:latin typeface="Nunito" pitchFamily="2" charset="77"/>
               </a:rPr>
-              <a:t>ações</a:t>
+              <a:t>grupo</a:t>
             </a:r>
             <a:r>
               <a:rPr lang="en-US" dirty="0">
                 <a:latin typeface="Nunito" pitchFamily="2" charset="77"/>
               </a:rPr>
-              <a:t> que </a:t>
+              <a:t> de records</a:t>
+            </a:r>
+          </a:p>
+          <a:p>
+            <a:pPr marL="285750" indent="-285750">
+              <a:buFontTx/>
+              <a:buChar char="-"/>
+            </a:pPr>
+            <a:r>
+              <a:rPr lang="en-US" dirty="0">
+                <a:latin typeface="Nunito" pitchFamily="2" charset="77"/>
+              </a:rPr>
+              <a:t>São </a:t>
             </a:r>
             <a:r>
               <a:rPr lang="en-US" dirty="0" err="1">
                 <a:latin typeface="Nunito" pitchFamily="2" charset="77"/>
               </a:rPr>
-              <a:t>acontecem</a:t>
+              <a:t>armazenados</a:t>
             </a:r>
             <a:r>
               <a:rPr lang="en-US" dirty="0">
                 <a:latin typeface="Nunito" pitchFamily="2" charset="77"/>
               </a:rPr>
-              <a:t> no </a:t>
+              <a:t> </a:t>
             </a:r>
             <a:r>
               <a:rPr lang="en-US" dirty="0" err="1">
                 <a:latin typeface="Nunito" pitchFamily="2" charset="77"/>
               </a:rPr>
-              <a:t>sistema</a:t>
+              <a:t>nos</a:t>
             </a:r>
             <a:r>
               <a:rPr lang="en-US" dirty="0">
                 <a:latin typeface="Nunito" pitchFamily="2" charset="77"/>
               </a:rPr>
+              <a:t> Brokers</a:t>
+            </a:r>
+          </a:p>
+          <a:p>
+            <a:pPr marL="285750" indent="-285750">
+              <a:buFontTx/>
+              <a:buChar char="-"/>
+            </a:pPr>
+            <a:r>
+              <a:rPr lang="en-US" dirty="0" err="1">
+                <a:latin typeface="Nunito" pitchFamily="2" charset="77"/>
+              </a:rPr>
+              <a:t>Gerenciado</a:t>
+            </a:r>
+            <a:r>
+              <a:rPr lang="en-US" dirty="0">
+                <a:latin typeface="Nunito" pitchFamily="2" charset="77"/>
+              </a:rPr>
               <a:t> </a:t>
             </a:r>
             <a:r>
               <a:rPr lang="en-US" dirty="0" err="1">
                 <a:latin typeface="Nunito" pitchFamily="2" charset="77"/>
               </a:rPr>
+              <a:t>pelo</a:t>
+            </a:r>
+            <a:r>
+              <a:rPr lang="en-US" dirty="0">
+                <a:latin typeface="Nunito" pitchFamily="2" charset="77"/>
+              </a:rPr>
+              <a:t> Zookeeper</a:t>
+            </a:r>
+          </a:p>
+          <a:p>
+            <a:pPr marL="285750" indent="-285750">
+              <a:buFontTx/>
+              <a:buChar char="-"/>
+            </a:pPr>
+            <a:r>
+              <a:rPr lang="en-US" dirty="0">
+                <a:latin typeface="Nunito" pitchFamily="2" charset="77"/>
+              </a:rPr>
+              <a:t>Delete/Compaction</a:t>
+            </a:r>
+          </a:p>
+          <a:p>
+            <a:r>
+              <a:rPr lang="pt-BR" b="1" dirty="0" err="1">
+                <a:latin typeface="Nunito" pitchFamily="2" charset="77"/>
+              </a:rPr>
+              <a:t>Partitions</a:t>
+            </a:r>
+            <a:endParaRPr lang="pt-BR" b="1" dirty="0">
+              <a:latin typeface="Nunito" pitchFamily="2" charset="77"/>
+            </a:endParaRPr>
+          </a:p>
+          <a:p>
+            <a:pPr marL="285750" indent="-285750">
+              <a:buFontTx/>
+              <a:buChar char="-"/>
+            </a:pPr>
+            <a:r>
+              <a:rPr lang="en-US" dirty="0" err="1">
+                <a:latin typeface="Nunito" pitchFamily="2" charset="77"/>
+              </a:rPr>
+              <a:t>Permite</a:t>
+            </a:r>
+            <a:r>
+              <a:rPr lang="en-US" dirty="0">
+                <a:latin typeface="Nunito" pitchFamily="2" charset="77"/>
+              </a:rPr>
+              <a:t> </a:t>
+            </a:r>
+            <a:r>
+              <a:rPr lang="en-US" dirty="0" err="1">
+                <a:latin typeface="Nunito" pitchFamily="2" charset="77"/>
+              </a:rPr>
+              <a:t>uma</a:t>
+            </a:r>
+            <a:r>
+              <a:rPr lang="en-US" dirty="0">
+                <a:latin typeface="Nunito" pitchFamily="2" charset="77"/>
+              </a:rPr>
+              <a:t> </a:t>
+            </a:r>
+            <a:r>
+              <a:rPr lang="en-US" dirty="0" err="1">
+                <a:latin typeface="Nunito" pitchFamily="2" charset="77"/>
+              </a:rPr>
+              <a:t>categoria</a:t>
+            </a:r>
+            <a:r>
+              <a:rPr lang="en-US" dirty="0">
+                <a:latin typeface="Nunito" pitchFamily="2" charset="77"/>
+              </a:rPr>
+              <a:t> </a:t>
+            </a:r>
+            <a:r>
+              <a:rPr lang="en-US" dirty="0" err="1">
+                <a:latin typeface="Nunito" pitchFamily="2" charset="77"/>
+              </a:rPr>
+              <a:t>existir</a:t>
+            </a:r>
+            <a:r>
+              <a:rPr lang="en-US" dirty="0">
+                <a:latin typeface="Nunito" pitchFamily="2" charset="77"/>
+              </a:rPr>
+              <a:t> </a:t>
+            </a:r>
+            <a:r>
+              <a:rPr lang="en-US" dirty="0" err="1">
+                <a:latin typeface="Nunito" pitchFamily="2" charset="77"/>
+              </a:rPr>
               <a:t>em</a:t>
             </a:r>
             <a:r>
               <a:rPr lang="en-US" dirty="0">
                 <a:latin typeface="Nunito" pitchFamily="2" charset="77"/>
               </a:rPr>
-              <a:t> tempo real.</a:t>
-            </a:r>
+              <a:t> N brokers</a:t>
+            </a:r>
+          </a:p>
+          <a:p>
+            <a:pPr marL="285750" indent="-285750">
+              <a:buFontTx/>
+              <a:buChar char="-"/>
+            </a:pPr>
+            <a:r>
+              <a:rPr lang="en-US" dirty="0">
+                <a:latin typeface="Nunito" pitchFamily="2" charset="77"/>
+              </a:rPr>
+              <a:t>A </a:t>
+            </a:r>
+            <a:r>
+              <a:rPr lang="en-US" dirty="0" err="1">
+                <a:latin typeface="Nunito" pitchFamily="2" charset="77"/>
+              </a:rPr>
+              <a:t>mesma</a:t>
+            </a:r>
+            <a:r>
+              <a:rPr lang="en-US" dirty="0">
+                <a:latin typeface="Nunito" pitchFamily="2" charset="77"/>
+              </a:rPr>
+              <a:t> </a:t>
+            </a:r>
+            <a:r>
+              <a:rPr lang="en-US" dirty="0" err="1">
+                <a:latin typeface="Nunito" pitchFamily="2" charset="77"/>
+              </a:rPr>
+              <a:t>mensagem</a:t>
+            </a:r>
+            <a:r>
+              <a:rPr lang="en-US" dirty="0">
+                <a:latin typeface="Nunito" pitchFamily="2" charset="77"/>
+              </a:rPr>
+              <a:t> </a:t>
+            </a:r>
+            <a:r>
+              <a:rPr lang="en-US" dirty="0" err="1">
+                <a:latin typeface="Nunito" pitchFamily="2" charset="77"/>
+              </a:rPr>
+              <a:t>não</a:t>
+            </a:r>
+            <a:r>
+              <a:rPr lang="en-US" dirty="0">
+                <a:latin typeface="Nunito" pitchFamily="2" charset="77"/>
+              </a:rPr>
+              <a:t> </a:t>
+            </a:r>
+            <a:r>
+              <a:rPr lang="en-US" dirty="0" err="1">
+                <a:latin typeface="Nunito" pitchFamily="2" charset="77"/>
+              </a:rPr>
+              <a:t>existe</a:t>
+            </a:r>
+            <a:r>
+              <a:rPr lang="en-US" dirty="0">
+                <a:latin typeface="Nunito" pitchFamily="2" charset="77"/>
+              </a:rPr>
+              <a:t> </a:t>
+            </a:r>
+            <a:r>
+              <a:rPr lang="en-US" dirty="0" err="1">
+                <a:latin typeface="Nunito" pitchFamily="2" charset="77"/>
+              </a:rPr>
+              <a:t>em</a:t>
+            </a:r>
+            <a:r>
+              <a:rPr lang="en-US" dirty="0">
+                <a:latin typeface="Nunito" pitchFamily="2" charset="77"/>
+              </a:rPr>
+              <a:t> N partitions</a:t>
+            </a:r>
+          </a:p>
+          <a:p>
+            <a:pPr marL="285750" indent="-285750">
+              <a:buFontTx/>
+              <a:buChar char="-"/>
+            </a:pPr>
+            <a:r>
+              <a:rPr lang="en-US" dirty="0">
+                <a:latin typeface="Nunito" pitchFamily="2" charset="77"/>
+              </a:rPr>
+              <a:t>Replicated Partitions</a:t>
+            </a:r>
+          </a:p>
+          <a:p>
+            <a:pPr marL="742950" lvl="1" indent="-285750">
+              <a:buFontTx/>
+              <a:buChar char="-"/>
+            </a:pPr>
+            <a:r>
+              <a:rPr lang="en-US" dirty="0" err="1">
+                <a:latin typeface="Nunito" pitchFamily="2" charset="77"/>
+              </a:rPr>
+              <a:t>Mesma</a:t>
+            </a:r>
+            <a:r>
+              <a:rPr lang="en-US" dirty="0">
+                <a:latin typeface="Nunito" pitchFamily="2" charset="77"/>
+              </a:rPr>
+              <a:t> partition </a:t>
+            </a:r>
+            <a:r>
+              <a:rPr lang="en-US" dirty="0" err="1">
+                <a:latin typeface="Nunito" pitchFamily="2" charset="77"/>
+              </a:rPr>
+              <a:t>em</a:t>
+            </a:r>
+            <a:r>
+              <a:rPr lang="en-US" dirty="0">
+                <a:latin typeface="Nunito" pitchFamily="2" charset="77"/>
+              </a:rPr>
+              <a:t> Brokers </a:t>
+            </a:r>
+            <a:r>
+              <a:rPr lang="en-US" dirty="0" err="1">
+                <a:latin typeface="Nunito" pitchFamily="2" charset="77"/>
+              </a:rPr>
+              <a:t>diferentes</a:t>
+            </a:r>
+            <a:endParaRPr lang="en-US" dirty="0">
+              <a:latin typeface="Nunito" pitchFamily="2" charset="77"/>
+            </a:endParaRPr>
           </a:p>
           <a:p>
             <a:pPr marL="285750" indent="-285750">
@@ -26844,13 +27354,13 @@
           <p:nvPr/>
         </p:nvPicPr>
         <p:blipFill>
-          <a:blip r:embed="rId5">
+          <a:blip r:embed="rId6">
             <a:extLst>
               <a:ext uri="{28A0092B-C50C-407E-A947-70E740481C1C}">
                 <a14:useLocalDpi xmlns:a14="http://schemas.microsoft.com/office/drawing/2010/main" val="0"/>
               </a:ext>
               <a:ext uri="{96DAC541-7B7A-43D3-8B79-37D633B846F1}">
-                <asvg:svgBlip xmlns:asvg="http://schemas.microsoft.com/office/drawing/2016/SVG/main" r:embed="rId6"/>
+                <asvg:svgBlip xmlns:asvg="http://schemas.microsoft.com/office/drawing/2016/SVG/main" r:embed="rId7"/>
               </a:ext>
             </a:extLst>
           </a:blip>
@@ -26990,22 +27500,20 @@
       </p:grpSpPr>
       <p:pic>
         <p:nvPicPr>
-          <p:cNvPr id="5" name="Espaço Reservado para Conteúdo 4">
+          <p:cNvPr id="7" name="Imagem 6">
             <a:extLst>
               <a:ext uri="{FF2B5EF4-FFF2-40B4-BE49-F238E27FC236}">
-                <a16:creationId xmlns:a16="http://schemas.microsoft.com/office/drawing/2014/main" id="{DEBCF998-65B9-41B2-A535-E5741DD64BE5}"/>
+                <a16:creationId xmlns:a16="http://schemas.microsoft.com/office/drawing/2014/main" id="{15EF5E79-A320-604B-B8D0-BB7CC7F3BD24}"/>
               </a:ext>
             </a:extLst>
           </p:cNvPr>
           <p:cNvPicPr>
-            <a:picLocks noGrp="1" noChangeAspect="1"/>
+            <a:picLocks noChangeAspect="1"/>
           </p:cNvPicPr>
-          <p:nvPr>
-            <p:ph idx="1"/>
-          </p:nvPr>
+          <p:nvPr/>
         </p:nvPicPr>
         <p:blipFill>
-          <a:blip r:embed="rId2">
+          <a:blip r:embed="rId3">
             <a:extLst>
               <a:ext uri="{28A0092B-C50C-407E-A947-70E740481C1C}">
                 <a14:useLocalDpi xmlns:a14="http://schemas.microsoft.com/office/drawing/2010/main" val="0"/>
@@ -27018,17 +27526,20 @@
         </p:blipFill>
         <p:spPr>
           <a:xfrm>
-            <a:off x="-11088" y="1"/>
-            <a:ext cx="12203088" cy="6881654"/>
+            <a:off x="-1" y="-1590"/>
+            <a:ext cx="12192001" cy="2021978"/>
           </a:xfrm>
+          <a:prstGeom prst="rect">
+            <a:avLst/>
+          </a:prstGeom>
         </p:spPr>
       </p:pic>
       <p:sp>
         <p:nvSpPr>
-          <p:cNvPr id="6" name="Título 1">
+          <p:cNvPr id="13" name="Título 1">
             <a:extLst>
               <a:ext uri="{FF2B5EF4-FFF2-40B4-BE49-F238E27FC236}">
-                <a16:creationId xmlns:a16="http://schemas.microsoft.com/office/drawing/2014/main" id="{EC993F68-2ABC-472C-9DAA-F49885B6553A}"/>
+                <a16:creationId xmlns:a16="http://schemas.microsoft.com/office/drawing/2014/main" id="{94E1A0D2-D048-46FE-90D3-722FBF740CC7}"/>
               </a:ext>
             </a:extLst>
           </p:cNvPr>
@@ -27041,8 +27552,8 @@
         </p:nvSpPr>
         <p:spPr>
           <a:xfrm>
-            <a:off x="29290" y="2418011"/>
-            <a:ext cx="11358357" cy="2021978"/>
+            <a:off x="2159726" y="0"/>
+            <a:ext cx="9292046" cy="2021978"/>
           </a:xfrm>
         </p:spPr>
         <p:txBody>
@@ -27051,31 +27562,24 @@
           </a:bodyPr>
           <a:lstStyle/>
           <a:p>
-            <a:pPr algn="ctr"/>
-            <a:r>
-              <a:rPr lang="pt-BR" sz="7300" dirty="0">
+            <a:r>
+              <a:rPr lang="pt-BR" dirty="0">
                 <a:solidFill>
                   <a:schemeClr val="bg1"/>
                 </a:solidFill>
                 <a:latin typeface="Nunito" pitchFamily="2" charset="77"/>
               </a:rPr>
-              <a:t>Dúvidas?</a:t>
-            </a:r>
-            <a:endParaRPr lang="pt-BR" sz="5400" dirty="0">
-              <a:solidFill>
-                <a:schemeClr val="bg1"/>
-              </a:solidFill>
-              <a:latin typeface="Nunito" pitchFamily="2" charset="77"/>
-            </a:endParaRPr>
+              <a:t>Producer</a:t>
+            </a:r>
           </a:p>
         </p:txBody>
       </p:sp>
       <p:pic>
         <p:nvPicPr>
-          <p:cNvPr id="4" name="Gráfico 3">
+          <p:cNvPr id="14" name="Gráfico 13">
             <a:extLst>
               <a:ext uri="{FF2B5EF4-FFF2-40B4-BE49-F238E27FC236}">
-                <a16:creationId xmlns:a16="http://schemas.microsoft.com/office/drawing/2014/main" id="{30B2841D-7CA4-4E0E-8F46-4FA75875DD08}"/>
+                <a16:creationId xmlns:a16="http://schemas.microsoft.com/office/drawing/2014/main" id="{2B5477E9-00BA-4494-BA1B-5466AC45994D}"/>
               </a:ext>
             </a:extLst>
           </p:cNvPr>
@@ -27085,13 +27589,10 @@
           <p:nvPr/>
         </p:nvPicPr>
         <p:blipFill>
-          <a:blip r:embed="rId3">
-            <a:extLst>
-              <a:ext uri="{28A0092B-C50C-407E-A947-70E740481C1C}">
-                <a14:useLocalDpi xmlns:a14="http://schemas.microsoft.com/office/drawing/2010/main" val="0"/>
-              </a:ext>
+          <a:blip r:embed="rId4">
+            <a:extLst>
               <a:ext uri="{96DAC541-7B7A-43D3-8B79-37D633B846F1}">
-                <asvg:svgBlip xmlns:asvg="http://schemas.microsoft.com/office/drawing/2016/SVG/main" r:embed="rId4"/>
+                <asvg:svgBlip xmlns:asvg="http://schemas.microsoft.com/office/drawing/2016/SVG/main" r:embed="rId5"/>
               </a:ext>
             </a:extLst>
           </a:blip>
@@ -27101,8 +27602,8 @@
         </p:blipFill>
         <p:spPr>
           <a:xfrm>
-            <a:off x="8042728" y="2538248"/>
-            <a:ext cx="1285750" cy="1648398"/>
+            <a:off x="1097280" y="636835"/>
+            <a:ext cx="610307" cy="705667"/>
           </a:xfrm>
           <a:prstGeom prst="rect">
             <a:avLst/>
@@ -27111,10 +27612,10 @@
       </p:pic>
       <p:sp>
         <p:nvSpPr>
-          <p:cNvPr id="7" name="CaixaDeTexto 6">
+          <p:cNvPr id="8" name="CaixaDeTexto 7">
             <a:extLst>
               <a:ext uri="{FF2B5EF4-FFF2-40B4-BE49-F238E27FC236}">
-                <a16:creationId xmlns:a16="http://schemas.microsoft.com/office/drawing/2014/main" id="{F156BB03-8A3B-4693-854F-02F1C8040212}"/>
+                <a16:creationId xmlns:a16="http://schemas.microsoft.com/office/drawing/2014/main" id="{29557DB5-A419-464F-8DE1-FE557705DF73}"/>
               </a:ext>
             </a:extLst>
           </p:cNvPr>
@@ -27123,8 +27624,8 @@
         </p:nvSpPr>
         <p:spPr>
           <a:xfrm>
-            <a:off x="3307223" y="3955813"/>
-            <a:ext cx="5052852" cy="400110"/>
+            <a:off x="1097280" y="2719343"/>
+            <a:ext cx="6400800" cy="4524315"/>
           </a:xfrm>
           <a:prstGeom prst="rect">
             <a:avLst/>
@@ -27137,64 +27638,463 @@
           </a:bodyPr>
           <a:lstStyle/>
           <a:p>
-            <a:pPr algn="ctr"/>
-            <a:r>
-              <a:rPr lang="pt-BR" sz="2000" dirty="0" err="1">
-                <a:solidFill>
-                  <a:schemeClr val="bg1"/>
-                </a:solidFill>
-                <a:latin typeface="Nunito" pitchFamily="2" charset="77"/>
-              </a:rPr>
-              <a:t>https</a:t>
-            </a:r>
-            <a:r>
-              <a:rPr lang="pt-BR" sz="2000" dirty="0">
-                <a:solidFill>
-                  <a:schemeClr val="bg1"/>
-                </a:solidFill>
-                <a:latin typeface="Nunito" pitchFamily="2" charset="77"/>
-              </a:rPr>
-              <a:t>://</a:t>
-            </a:r>
-            <a:r>
-              <a:rPr lang="pt-BR" sz="2000" dirty="0" err="1">
-                <a:solidFill>
-                  <a:schemeClr val="bg1"/>
-                </a:solidFill>
-                <a:latin typeface="Nunito" pitchFamily="2" charset="77"/>
-              </a:rPr>
-              <a:t>balta.io</a:t>
-            </a:r>
-            <a:r>
-              <a:rPr lang="pt-BR" sz="2000" dirty="0">
-                <a:solidFill>
-                  <a:schemeClr val="bg1"/>
-                </a:solidFill>
-                <a:latin typeface="Nunito" pitchFamily="2" charset="77"/>
-              </a:rPr>
-              <a:t>/ajuda</a:t>
-            </a:r>
+            <a:r>
+              <a:rPr lang="pt-BR" b="1" dirty="0">
+                <a:latin typeface="Nunito" pitchFamily="2" charset="77"/>
+              </a:rPr>
+              <a:t>Record</a:t>
+            </a:r>
+          </a:p>
+          <a:p>
+            <a:pPr marL="285750" indent="-285750">
+              <a:buFontTx/>
+              <a:buChar char="-"/>
+            </a:pPr>
+            <a:r>
+              <a:rPr lang="en-US" dirty="0">
+                <a:latin typeface="Nunito" pitchFamily="2" charset="77"/>
+              </a:rPr>
+              <a:t>Key, Value, Timestamp</a:t>
+            </a:r>
+          </a:p>
+          <a:p>
+            <a:pPr marL="742950" lvl="1" indent="-285750">
+              <a:buFontTx/>
+              <a:buChar char="-"/>
+            </a:pPr>
+            <a:r>
+              <a:rPr lang="en-US" dirty="0">
+                <a:latin typeface="Nunito" pitchFamily="2" charset="77"/>
+              </a:rPr>
+              <a:t>Key e Value = </a:t>
+            </a:r>
+            <a:r>
+              <a:rPr lang="en-US" dirty="0" err="1">
+                <a:latin typeface="Nunito" pitchFamily="2" charset="77"/>
+              </a:rPr>
+              <a:t>Qualquer</a:t>
+            </a:r>
+            <a:r>
+              <a:rPr lang="en-US" dirty="0">
+                <a:latin typeface="Nunito" pitchFamily="2" charset="77"/>
+              </a:rPr>
+              <a:t> </a:t>
+            </a:r>
+            <a:r>
+              <a:rPr lang="en-US" dirty="0" err="1">
+                <a:latin typeface="Nunito" pitchFamily="2" charset="77"/>
+              </a:rPr>
+              <a:t>coisa</a:t>
+            </a:r>
+            <a:endParaRPr lang="en-US" dirty="0">
+              <a:latin typeface="Nunito" pitchFamily="2" charset="77"/>
+            </a:endParaRPr>
+          </a:p>
+          <a:p>
+            <a:r>
+              <a:rPr lang="pt-BR" b="1" dirty="0" err="1">
+                <a:latin typeface="Nunito" pitchFamily="2" charset="77"/>
+              </a:rPr>
+              <a:t>Topic</a:t>
+            </a:r>
+            <a:endParaRPr lang="pt-BR" b="1" dirty="0">
+              <a:latin typeface="Nunito" pitchFamily="2" charset="77"/>
+            </a:endParaRPr>
+          </a:p>
+          <a:p>
+            <a:pPr marL="285750" indent="-285750">
+              <a:buFontTx/>
+              <a:buChar char="-"/>
+            </a:pPr>
+            <a:r>
+              <a:rPr lang="en-US" dirty="0" err="1">
+                <a:latin typeface="Nunito" pitchFamily="2" charset="77"/>
+              </a:rPr>
+              <a:t>Categoria</a:t>
+            </a:r>
+            <a:r>
+              <a:rPr lang="en-US" dirty="0">
+                <a:latin typeface="Nunito" pitchFamily="2" charset="77"/>
+              </a:rPr>
+              <a:t> de um </a:t>
+            </a:r>
+            <a:r>
+              <a:rPr lang="en-US" dirty="0" err="1">
+                <a:latin typeface="Nunito" pitchFamily="2" charset="77"/>
+              </a:rPr>
+              <a:t>grupo</a:t>
+            </a:r>
+            <a:r>
+              <a:rPr lang="en-US" dirty="0">
+                <a:latin typeface="Nunito" pitchFamily="2" charset="77"/>
+              </a:rPr>
+              <a:t> de records</a:t>
+            </a:r>
+          </a:p>
+          <a:p>
+            <a:pPr marL="285750" indent="-285750">
+              <a:buFontTx/>
+              <a:buChar char="-"/>
+            </a:pPr>
+            <a:r>
+              <a:rPr lang="en-US" dirty="0">
+                <a:latin typeface="Nunito" pitchFamily="2" charset="77"/>
+              </a:rPr>
+              <a:t>São </a:t>
+            </a:r>
+            <a:r>
+              <a:rPr lang="en-US" dirty="0" err="1">
+                <a:latin typeface="Nunito" pitchFamily="2" charset="77"/>
+              </a:rPr>
+              <a:t>armazenados</a:t>
+            </a:r>
+            <a:r>
+              <a:rPr lang="en-US" dirty="0">
+                <a:latin typeface="Nunito" pitchFamily="2" charset="77"/>
+              </a:rPr>
+              <a:t> </a:t>
+            </a:r>
+            <a:r>
+              <a:rPr lang="en-US" dirty="0" err="1">
+                <a:latin typeface="Nunito" pitchFamily="2" charset="77"/>
+              </a:rPr>
+              <a:t>nos</a:t>
+            </a:r>
+            <a:r>
+              <a:rPr lang="en-US" dirty="0">
+                <a:latin typeface="Nunito" pitchFamily="2" charset="77"/>
+              </a:rPr>
+              <a:t> Brokers</a:t>
+            </a:r>
+          </a:p>
+          <a:p>
+            <a:pPr marL="285750" indent="-285750">
+              <a:buFontTx/>
+              <a:buChar char="-"/>
+            </a:pPr>
+            <a:r>
+              <a:rPr lang="en-US" dirty="0" err="1">
+                <a:latin typeface="Nunito" pitchFamily="2" charset="77"/>
+              </a:rPr>
+              <a:t>Gerenciado</a:t>
+            </a:r>
+            <a:r>
+              <a:rPr lang="en-US" dirty="0">
+                <a:latin typeface="Nunito" pitchFamily="2" charset="77"/>
+              </a:rPr>
+              <a:t> </a:t>
+            </a:r>
+            <a:r>
+              <a:rPr lang="en-US" dirty="0" err="1">
+                <a:latin typeface="Nunito" pitchFamily="2" charset="77"/>
+              </a:rPr>
+              <a:t>pelo</a:t>
+            </a:r>
+            <a:r>
+              <a:rPr lang="en-US" dirty="0">
+                <a:latin typeface="Nunito" pitchFamily="2" charset="77"/>
+              </a:rPr>
+              <a:t> Zookeeper</a:t>
+            </a:r>
+          </a:p>
+          <a:p>
+            <a:pPr marL="285750" indent="-285750">
+              <a:buFontTx/>
+              <a:buChar char="-"/>
+            </a:pPr>
+            <a:r>
+              <a:rPr lang="en-US" dirty="0">
+                <a:latin typeface="Nunito" pitchFamily="2" charset="77"/>
+              </a:rPr>
+              <a:t>Delete/Compaction</a:t>
+            </a:r>
+          </a:p>
+          <a:p>
+            <a:r>
+              <a:rPr lang="pt-BR" b="1" dirty="0" err="1">
+                <a:latin typeface="Nunito" pitchFamily="2" charset="77"/>
+              </a:rPr>
+              <a:t>Partitions</a:t>
+            </a:r>
+            <a:endParaRPr lang="pt-BR" b="1" dirty="0">
+              <a:latin typeface="Nunito" pitchFamily="2" charset="77"/>
+            </a:endParaRPr>
+          </a:p>
+          <a:p>
+            <a:pPr marL="285750" indent="-285750">
+              <a:buFontTx/>
+              <a:buChar char="-"/>
+            </a:pPr>
+            <a:r>
+              <a:rPr lang="en-US" dirty="0" err="1">
+                <a:latin typeface="Nunito" pitchFamily="2" charset="77"/>
+              </a:rPr>
+              <a:t>Permite</a:t>
+            </a:r>
+            <a:r>
+              <a:rPr lang="en-US" dirty="0">
+                <a:latin typeface="Nunito" pitchFamily="2" charset="77"/>
+              </a:rPr>
+              <a:t> </a:t>
+            </a:r>
+            <a:r>
+              <a:rPr lang="en-US" dirty="0" err="1">
+                <a:latin typeface="Nunito" pitchFamily="2" charset="77"/>
+              </a:rPr>
+              <a:t>uma</a:t>
+            </a:r>
+            <a:r>
+              <a:rPr lang="en-US" dirty="0">
+                <a:latin typeface="Nunito" pitchFamily="2" charset="77"/>
+              </a:rPr>
+              <a:t> </a:t>
+            </a:r>
+            <a:r>
+              <a:rPr lang="en-US" dirty="0" err="1">
+                <a:latin typeface="Nunito" pitchFamily="2" charset="77"/>
+              </a:rPr>
+              <a:t>categoria</a:t>
+            </a:r>
+            <a:r>
+              <a:rPr lang="en-US" dirty="0">
+                <a:latin typeface="Nunito" pitchFamily="2" charset="77"/>
+              </a:rPr>
+              <a:t> </a:t>
+            </a:r>
+            <a:r>
+              <a:rPr lang="en-US" dirty="0" err="1">
+                <a:latin typeface="Nunito" pitchFamily="2" charset="77"/>
+              </a:rPr>
+              <a:t>existir</a:t>
+            </a:r>
+            <a:r>
+              <a:rPr lang="en-US" dirty="0">
+                <a:latin typeface="Nunito" pitchFamily="2" charset="77"/>
+              </a:rPr>
+              <a:t> </a:t>
+            </a:r>
+            <a:r>
+              <a:rPr lang="en-US" dirty="0" err="1">
+                <a:latin typeface="Nunito" pitchFamily="2" charset="77"/>
+              </a:rPr>
+              <a:t>em</a:t>
+            </a:r>
+            <a:r>
+              <a:rPr lang="en-US" dirty="0">
+                <a:latin typeface="Nunito" pitchFamily="2" charset="77"/>
+              </a:rPr>
+              <a:t> N brokers</a:t>
+            </a:r>
+          </a:p>
+          <a:p>
+            <a:pPr marL="285750" indent="-285750">
+              <a:buFontTx/>
+              <a:buChar char="-"/>
+            </a:pPr>
+            <a:r>
+              <a:rPr lang="en-US" dirty="0">
+                <a:latin typeface="Nunito" pitchFamily="2" charset="77"/>
+              </a:rPr>
+              <a:t>A </a:t>
+            </a:r>
+            <a:r>
+              <a:rPr lang="en-US" dirty="0" err="1">
+                <a:latin typeface="Nunito" pitchFamily="2" charset="77"/>
+              </a:rPr>
+              <a:t>mesma</a:t>
+            </a:r>
+            <a:r>
+              <a:rPr lang="en-US" dirty="0">
+                <a:latin typeface="Nunito" pitchFamily="2" charset="77"/>
+              </a:rPr>
+              <a:t> </a:t>
+            </a:r>
+            <a:r>
+              <a:rPr lang="en-US" dirty="0" err="1">
+                <a:latin typeface="Nunito" pitchFamily="2" charset="77"/>
+              </a:rPr>
+              <a:t>mensagem</a:t>
+            </a:r>
+            <a:r>
+              <a:rPr lang="en-US" dirty="0">
+                <a:latin typeface="Nunito" pitchFamily="2" charset="77"/>
+              </a:rPr>
+              <a:t> </a:t>
+            </a:r>
+            <a:r>
+              <a:rPr lang="en-US" dirty="0" err="1">
+                <a:latin typeface="Nunito" pitchFamily="2" charset="77"/>
+              </a:rPr>
+              <a:t>não</a:t>
+            </a:r>
+            <a:r>
+              <a:rPr lang="en-US" dirty="0">
+                <a:latin typeface="Nunito" pitchFamily="2" charset="77"/>
+              </a:rPr>
+              <a:t> </a:t>
+            </a:r>
+            <a:r>
+              <a:rPr lang="en-US" dirty="0" err="1">
+                <a:latin typeface="Nunito" pitchFamily="2" charset="77"/>
+              </a:rPr>
+              <a:t>existe</a:t>
+            </a:r>
+            <a:r>
+              <a:rPr lang="en-US" dirty="0">
+                <a:latin typeface="Nunito" pitchFamily="2" charset="77"/>
+              </a:rPr>
+              <a:t> </a:t>
+            </a:r>
+            <a:r>
+              <a:rPr lang="en-US" dirty="0" err="1">
+                <a:latin typeface="Nunito" pitchFamily="2" charset="77"/>
+              </a:rPr>
+              <a:t>em</a:t>
+            </a:r>
+            <a:r>
+              <a:rPr lang="en-US" dirty="0">
+                <a:latin typeface="Nunito" pitchFamily="2" charset="77"/>
+              </a:rPr>
+              <a:t> N partitions</a:t>
+            </a:r>
+          </a:p>
+          <a:p>
+            <a:pPr marL="285750" indent="-285750">
+              <a:buFontTx/>
+              <a:buChar char="-"/>
+            </a:pPr>
+            <a:r>
+              <a:rPr lang="en-US" dirty="0">
+                <a:latin typeface="Nunito" pitchFamily="2" charset="77"/>
+              </a:rPr>
+              <a:t>Replicated Partitions</a:t>
+            </a:r>
+          </a:p>
+          <a:p>
+            <a:pPr marL="742950" lvl="1" indent="-285750">
+              <a:buFontTx/>
+              <a:buChar char="-"/>
+            </a:pPr>
+            <a:r>
+              <a:rPr lang="en-US" dirty="0" err="1">
+                <a:latin typeface="Nunito" pitchFamily="2" charset="77"/>
+              </a:rPr>
+              <a:t>Mesma</a:t>
+            </a:r>
+            <a:r>
+              <a:rPr lang="en-US" dirty="0">
+                <a:latin typeface="Nunito" pitchFamily="2" charset="77"/>
+              </a:rPr>
+              <a:t> partition </a:t>
+            </a:r>
+            <a:r>
+              <a:rPr lang="en-US" dirty="0" err="1">
+                <a:latin typeface="Nunito" pitchFamily="2" charset="77"/>
+              </a:rPr>
+              <a:t>em</a:t>
+            </a:r>
+            <a:r>
+              <a:rPr lang="en-US" dirty="0">
+                <a:latin typeface="Nunito" pitchFamily="2" charset="77"/>
+              </a:rPr>
+              <a:t> Brokers </a:t>
+            </a:r>
+            <a:r>
+              <a:rPr lang="en-US" dirty="0" err="1">
+                <a:latin typeface="Nunito" pitchFamily="2" charset="77"/>
+              </a:rPr>
+              <a:t>diferentes</a:t>
+            </a:r>
+            <a:endParaRPr lang="en-US" dirty="0">
+              <a:latin typeface="Nunito" pitchFamily="2" charset="77"/>
+            </a:endParaRPr>
+          </a:p>
+          <a:p>
+            <a:pPr marL="285750" indent="-285750">
+              <a:buFontTx/>
+              <a:buChar char="-"/>
+            </a:pPr>
+            <a:endParaRPr lang="en-US" dirty="0">
+              <a:latin typeface="Montserrat Light" panose="00000400000000000000" pitchFamily="2" charset="0"/>
+            </a:endParaRPr>
+          </a:p>
+          <a:p>
+            <a:pPr marL="285750" indent="-285750">
+              <a:buFontTx/>
+              <a:buChar char="-"/>
+            </a:pPr>
+            <a:endParaRPr lang="pt-BR" dirty="0">
+              <a:latin typeface="Montserrat Light" panose="00000400000000000000" pitchFamily="2" charset="0"/>
+            </a:endParaRPr>
+          </a:p>
+          <a:p>
+            <a:pPr marL="285750" indent="-285750">
+              <a:buFontTx/>
+              <a:buChar char="-"/>
+            </a:pPr>
+            <a:endParaRPr lang="pt-BR" dirty="0">
+              <a:latin typeface="Montserrat Light" panose="00000400000000000000" pitchFamily="2" charset="0"/>
+            </a:endParaRPr>
           </a:p>
         </p:txBody>
       </p:sp>
+      <p:pic>
+        <p:nvPicPr>
+          <p:cNvPr id="3" name="Gráfico 2">
+            <a:extLst>
+              <a:ext uri="{FF2B5EF4-FFF2-40B4-BE49-F238E27FC236}">
+                <a16:creationId xmlns:a16="http://schemas.microsoft.com/office/drawing/2014/main" id="{CBA04222-E9A5-46A3-809E-82ED64A96098}"/>
+              </a:ext>
+            </a:extLst>
+          </p:cNvPr>
+          <p:cNvPicPr>
+            <a:picLocks noChangeAspect="1"/>
+          </p:cNvPicPr>
+          <p:nvPr/>
+        </p:nvPicPr>
+        <p:blipFill>
+          <a:blip r:embed="rId6">
+            <a:extLst>
+              <a:ext uri="{28A0092B-C50C-407E-A947-70E740481C1C}">
+                <a14:useLocalDpi xmlns:a14="http://schemas.microsoft.com/office/drawing/2010/main" val="0"/>
+              </a:ext>
+              <a:ext uri="{96DAC541-7B7A-43D3-8B79-37D633B846F1}">
+                <asvg:svgBlip xmlns:asvg="http://schemas.microsoft.com/office/drawing/2016/SVG/main" r:embed="rId7"/>
+              </a:ext>
+            </a:extLst>
+          </a:blip>
+          <a:stretch>
+            <a:fillRect/>
+          </a:stretch>
+        </p:blipFill>
+        <p:spPr>
+          <a:xfrm>
+            <a:off x="6012472" y="2719343"/>
+            <a:ext cx="5439300" cy="3275393"/>
+          </a:xfrm>
+          <a:prstGeom prst="rect">
+            <a:avLst/>
+          </a:prstGeom>
+        </p:spPr>
+      </p:pic>
     </p:spTree>
     <p:extLst>
       <p:ext uri="{BB962C8B-B14F-4D97-AF65-F5344CB8AC3E}">
-        <p14:creationId xmlns:p14="http://schemas.microsoft.com/office/powerpoint/2010/main" val="797744895"/>
+        <p14:creationId xmlns:p14="http://schemas.microsoft.com/office/powerpoint/2010/main" val="1954672123"/>
       </p:ext>
     </p:extLst>
   </p:cSld>
   <p:clrMapOvr>
     <a:masterClrMapping/>
   </p:clrMapOvr>
-  <mc:AlternateContent xmlns:mc="http://schemas.openxmlformats.org/markup-compatibility/2006" xmlns:p14="http://schemas.microsoft.com/office/powerpoint/2010/main">
-    <mc:Choice Requires="p14">
-      <p:transition spd="med" p14:dur="700">
-        <p:fade/>
+  <mc:AlternateContent xmlns:mc="http://schemas.openxmlformats.org/markup-compatibility/2006" xmlns:p159="http://schemas.microsoft.com/office/powerpoint/2015/09/main">
+    <mc:Choice Requires="p159">
+      <p:transition xmlns:p14="http://schemas.microsoft.com/office/powerpoint/2010/main" spd="slow" p14:dur="2000">
+        <p159:morph option="byObject"/>
       </p:transition>
     </mc:Choice>
     <mc:Fallback xmlns="">
-      <p:transition spd="med">
+      <p:transition spd="slow">
         <p:fade/>
       </p:transition>
     </mc:Fallback>
@@ -27211,9 +28111,6 @@
                     <p:cTn id="3" fill="hold">
                       <p:stCondLst>
                         <p:cond delay="indefinite"/>
-                        <p:cond evt="onBegin" delay="0">
-                          <p:tn val="2"/>
-                        </p:cond>
                       </p:stCondLst>
                       <p:childTnLst>
                         <p:par>
@@ -27223,7 +28120,7 @@
                             </p:stCondLst>
                             <p:childTnLst>
                               <p:par>
-                                <p:cTn id="5" presetID="10" presetClass="entr" presetSubtype="0" fill="hold" grpId="0" nodeType="afterEffect">
+                                <p:cTn id="5" presetID="1" presetClass="entr" presetSubtype="0" fill="hold" grpId="0" nodeType="clickEffect">
                                   <p:stCondLst>
                                     <p:cond delay="0"/>
                                   </p:stCondLst>
@@ -27236,7 +28133,7 @@
                                           </p:stCondLst>
                                         </p:cTn>
                                         <p:tgtEl>
-                                          <p:spTgt spid="6"/>
+                                          <p:spTgt spid="8"/>
                                         </p:tgtEl>
                                         <p:attrNameLst>
                                           <p:attrName>style.visibility</p:attrName>
@@ -27246,89 +28143,6 @@
                                         <p:strVal val="visible"/>
                                       </p:to>
                                     </p:set>
-                                    <p:animEffect transition="in" filter="fade">
-                                      <p:cBhvr>
-                                        <p:cTn id="7" dur="500"/>
-                                        <p:tgtEl>
-                                          <p:spTgt spid="6"/>
-                                        </p:tgtEl>
-                                      </p:cBhvr>
-                                    </p:animEffect>
-                                  </p:childTnLst>
-                                </p:cTn>
-                              </p:par>
-                            </p:childTnLst>
-                          </p:cTn>
-                        </p:par>
-                        <p:par>
-                          <p:cTn id="8" fill="hold">
-                            <p:stCondLst>
-                              <p:cond delay="500"/>
-                            </p:stCondLst>
-                            <p:childTnLst>
-                              <p:par>
-                                <p:cTn id="9" presetID="10" presetClass="entr" presetSubtype="0" fill="hold" nodeType="afterEffect">
-                                  <p:stCondLst>
-                                    <p:cond delay="0"/>
-                                  </p:stCondLst>
-                                  <p:childTnLst>
-                                    <p:set>
-                                      <p:cBhvr>
-                                        <p:cTn id="10" dur="1" fill="hold">
-                                          <p:stCondLst>
-                                            <p:cond delay="0"/>
-                                          </p:stCondLst>
-                                        </p:cTn>
-                                        <p:tgtEl>
-                                          <p:spTgt spid="4"/>
-                                        </p:tgtEl>
-                                        <p:attrNameLst>
-                                          <p:attrName>style.visibility</p:attrName>
-                                        </p:attrNameLst>
-                                      </p:cBhvr>
-                                      <p:to>
-                                        <p:strVal val="visible"/>
-                                      </p:to>
-                                    </p:set>
-                                    <p:animEffect transition="in" filter="fade">
-                                      <p:cBhvr>
-                                        <p:cTn id="11" dur="500"/>
-                                        <p:tgtEl>
-                                          <p:spTgt spid="4"/>
-                                        </p:tgtEl>
-                                      </p:cBhvr>
-                                    </p:animEffect>
-                                  </p:childTnLst>
-                                </p:cTn>
-                              </p:par>
-                            </p:childTnLst>
-                          </p:cTn>
-                        </p:par>
-                        <p:par>
-                          <p:cTn id="12" fill="hold">
-                            <p:stCondLst>
-                              <p:cond delay="1000"/>
-                            </p:stCondLst>
-                            <p:childTnLst>
-                              <p:par>
-                                <p:cTn id="13" presetID="42" presetClass="path" presetSubtype="0" repeatCount="indefinite" accel="50000" decel="50000" autoRev="1" fill="hold" nodeType="afterEffect">
-                                  <p:stCondLst>
-                                    <p:cond delay="0"/>
-                                  </p:stCondLst>
-                                  <p:childTnLst>
-                                    <p:animMotion origin="layout" path="M 2.08333E-7 2.22222E-6 L 0.00052 0.05208 " pathEditMode="relative" rAng="0" ptsTypes="AA">
-                                      <p:cBhvr>
-                                        <p:cTn id="14" dur="2000" fill="hold"/>
-                                        <p:tgtEl>
-                                          <p:spTgt spid="4"/>
-                                        </p:tgtEl>
-                                        <p:attrNameLst>
-                                          <p:attrName>ppt_x</p:attrName>
-                                          <p:attrName>ppt_y</p:attrName>
-                                        </p:attrNameLst>
-                                      </p:cBhvr>
-                                      <p:rCtr x="26" y="2593"/>
-                                    </p:animMotion>
                                   </p:childTnLst>
                                 </p:cTn>
                               </p:par>
@@ -27360,7 +28174,531 @@
       </p:par>
     </p:tnLst>
     <p:bldLst>
-      <p:bldP spid="6" grpId="0"/>
+      <p:bldP spid="8" grpId="0"/>
+    </p:bldLst>
+  </p:timing>
+</p:sld>
+</file>
+
+<file path=ppt/slides/slide39.xml><?xml version="1.0" encoding="utf-8"?>
+<p:sld xmlns:a="http://schemas.openxmlformats.org/drawingml/2006/main" xmlns:r="http://schemas.openxmlformats.org/officeDocument/2006/relationships" xmlns:p="http://schemas.openxmlformats.org/presentationml/2006/main">
+  <p:cSld>
+    <p:spTree>
+      <p:nvGrpSpPr>
+        <p:cNvPr id="1" name=""/>
+        <p:cNvGrpSpPr/>
+        <p:nvPr/>
+      </p:nvGrpSpPr>
+      <p:grpSpPr>
+        <a:xfrm>
+          <a:off x="0" y="0"/>
+          <a:ext cx="0" cy="0"/>
+          <a:chOff x="0" y="0"/>
+          <a:chExt cx="0" cy="0"/>
+        </a:xfrm>
+      </p:grpSpPr>
+      <p:pic>
+        <p:nvPicPr>
+          <p:cNvPr id="7" name="Imagem 6">
+            <a:extLst>
+              <a:ext uri="{FF2B5EF4-FFF2-40B4-BE49-F238E27FC236}">
+                <a16:creationId xmlns:a16="http://schemas.microsoft.com/office/drawing/2014/main" id="{15EF5E79-A320-604B-B8D0-BB7CC7F3BD24}"/>
+              </a:ext>
+            </a:extLst>
+          </p:cNvPr>
+          <p:cNvPicPr>
+            <a:picLocks noChangeAspect="1"/>
+          </p:cNvPicPr>
+          <p:nvPr/>
+        </p:nvPicPr>
+        <p:blipFill>
+          <a:blip r:embed="rId2">
+            <a:extLst>
+              <a:ext uri="{28A0092B-C50C-407E-A947-70E740481C1C}">
+                <a14:useLocalDpi xmlns:a14="http://schemas.microsoft.com/office/drawing/2010/main" val="0"/>
+              </a:ext>
+            </a:extLst>
+          </a:blip>
+          <a:stretch>
+            <a:fillRect/>
+          </a:stretch>
+        </p:blipFill>
+        <p:spPr>
+          <a:xfrm>
+            <a:off x="-1" y="-1590"/>
+            <a:ext cx="12192001" cy="2021978"/>
+          </a:xfrm>
+          <a:prstGeom prst="rect">
+            <a:avLst/>
+          </a:prstGeom>
+        </p:spPr>
+      </p:pic>
+      <p:sp>
+        <p:nvSpPr>
+          <p:cNvPr id="13" name="Título 1">
+            <a:extLst>
+              <a:ext uri="{FF2B5EF4-FFF2-40B4-BE49-F238E27FC236}">
+                <a16:creationId xmlns:a16="http://schemas.microsoft.com/office/drawing/2014/main" id="{94E1A0D2-D048-46FE-90D3-722FBF740CC7}"/>
+              </a:ext>
+            </a:extLst>
+          </p:cNvPr>
+          <p:cNvSpPr>
+            <a:spLocks noGrp="1"/>
+          </p:cNvSpPr>
+          <p:nvPr>
+            <p:ph type="title"/>
+          </p:nvPr>
+        </p:nvSpPr>
+        <p:spPr>
+          <a:xfrm>
+            <a:off x="2159726" y="0"/>
+            <a:ext cx="9292046" cy="2021978"/>
+          </a:xfrm>
+        </p:spPr>
+        <p:txBody>
+          <a:bodyPr>
+            <a:normAutofit/>
+          </a:bodyPr>
+          <a:lstStyle/>
+          <a:p>
+            <a:r>
+              <a:rPr lang="pt-BR" dirty="0">
+                <a:solidFill>
+                  <a:schemeClr val="bg1"/>
+                </a:solidFill>
+                <a:latin typeface="Nunito" pitchFamily="2" charset="77"/>
+              </a:rPr>
+              <a:t>Streaming</a:t>
+            </a:r>
+          </a:p>
+        </p:txBody>
+      </p:sp>
+      <p:pic>
+        <p:nvPicPr>
+          <p:cNvPr id="14" name="Gráfico 13">
+            <a:extLst>
+              <a:ext uri="{FF2B5EF4-FFF2-40B4-BE49-F238E27FC236}">
+                <a16:creationId xmlns:a16="http://schemas.microsoft.com/office/drawing/2014/main" id="{2B5477E9-00BA-4494-BA1B-5466AC45994D}"/>
+              </a:ext>
+            </a:extLst>
+          </p:cNvPr>
+          <p:cNvPicPr>
+            <a:picLocks noChangeAspect="1"/>
+          </p:cNvPicPr>
+          <p:nvPr/>
+        </p:nvPicPr>
+        <p:blipFill>
+          <a:blip r:embed="rId3">
+            <a:extLst>
+              <a:ext uri="{96DAC541-7B7A-43D3-8B79-37D633B846F1}">
+                <asvg:svgBlip xmlns:asvg="http://schemas.microsoft.com/office/drawing/2016/SVG/main" r:embed="rId4"/>
+              </a:ext>
+            </a:extLst>
+          </a:blip>
+          <a:stretch>
+            <a:fillRect/>
+          </a:stretch>
+        </p:blipFill>
+        <p:spPr>
+          <a:xfrm>
+            <a:off x="1097280" y="636835"/>
+            <a:ext cx="610307" cy="705667"/>
+          </a:xfrm>
+          <a:prstGeom prst="rect">
+            <a:avLst/>
+          </a:prstGeom>
+        </p:spPr>
+      </p:pic>
+      <p:sp>
+        <p:nvSpPr>
+          <p:cNvPr id="8" name="CaixaDeTexto 7">
+            <a:extLst>
+              <a:ext uri="{FF2B5EF4-FFF2-40B4-BE49-F238E27FC236}">
+                <a16:creationId xmlns:a16="http://schemas.microsoft.com/office/drawing/2014/main" id="{29557DB5-A419-464F-8DE1-FE557705DF73}"/>
+              </a:ext>
+            </a:extLst>
+          </p:cNvPr>
+          <p:cNvSpPr txBox="1"/>
+          <p:nvPr/>
+        </p:nvSpPr>
+        <p:spPr>
+          <a:xfrm>
+            <a:off x="1097280" y="2719343"/>
+            <a:ext cx="6400800" cy="2585323"/>
+          </a:xfrm>
+          <a:prstGeom prst="rect">
+            <a:avLst/>
+          </a:prstGeom>
+          <a:noFill/>
+        </p:spPr>
+        <p:txBody>
+          <a:bodyPr wrap="square" rtlCol="0">
+            <a:spAutoFit/>
+          </a:bodyPr>
+          <a:lstStyle/>
+          <a:p>
+            <a:r>
+              <a:rPr lang="pt-BR" b="1" dirty="0">
+                <a:latin typeface="Nunito" pitchFamily="2" charset="77"/>
+              </a:rPr>
+              <a:t>Mensagem</a:t>
+            </a:r>
+          </a:p>
+          <a:p>
+            <a:pPr marL="285750" indent="-285750">
+              <a:buFontTx/>
+              <a:buChar char="-"/>
+            </a:pPr>
+            <a:r>
+              <a:rPr lang="en-US" dirty="0">
+                <a:latin typeface="Nunito" pitchFamily="2" charset="77"/>
+              </a:rPr>
+              <a:t>É o </a:t>
+            </a:r>
+            <a:r>
+              <a:rPr lang="en-US" dirty="0" err="1">
+                <a:latin typeface="Nunito" pitchFamily="2" charset="77"/>
+              </a:rPr>
+              <a:t>ato</a:t>
+            </a:r>
+            <a:r>
+              <a:rPr lang="en-US" dirty="0">
+                <a:latin typeface="Nunito" pitchFamily="2" charset="77"/>
+              </a:rPr>
+              <a:t> de </a:t>
+            </a:r>
+            <a:r>
+              <a:rPr lang="en-US" dirty="0" err="1">
+                <a:latin typeface="Nunito" pitchFamily="2" charset="77"/>
+              </a:rPr>
+              <a:t>processar</a:t>
+            </a:r>
+            <a:r>
+              <a:rPr lang="en-US" dirty="0">
+                <a:latin typeface="Nunito" pitchFamily="2" charset="77"/>
+              </a:rPr>
+              <a:t> </a:t>
+            </a:r>
+            <a:r>
+              <a:rPr lang="en-US" dirty="0" err="1">
+                <a:latin typeface="Nunito" pitchFamily="2" charset="77"/>
+              </a:rPr>
+              <a:t>os</a:t>
+            </a:r>
+            <a:r>
+              <a:rPr lang="en-US" dirty="0">
+                <a:latin typeface="Nunito" pitchFamily="2" charset="77"/>
+              </a:rPr>
+              <a:t> </a:t>
+            </a:r>
+            <a:r>
+              <a:rPr lang="en-US" dirty="0" err="1">
+                <a:latin typeface="Nunito" pitchFamily="2" charset="77"/>
+              </a:rPr>
+              <a:t>eventos</a:t>
+            </a:r>
+            <a:r>
+              <a:rPr lang="en-US" dirty="0">
+                <a:latin typeface="Nunito" pitchFamily="2" charset="77"/>
+              </a:rPr>
+              <a:t>, um a um, </a:t>
+            </a:r>
+            <a:r>
+              <a:rPr lang="en-US" dirty="0" err="1">
+                <a:latin typeface="Nunito" pitchFamily="2" charset="77"/>
+              </a:rPr>
+              <a:t>na</a:t>
+            </a:r>
+            <a:r>
+              <a:rPr lang="en-US" dirty="0">
+                <a:latin typeface="Nunito" pitchFamily="2" charset="77"/>
+              </a:rPr>
+              <a:t> </a:t>
+            </a:r>
+            <a:r>
+              <a:rPr lang="en-US" dirty="0" err="1">
+                <a:latin typeface="Nunito" pitchFamily="2" charset="77"/>
+              </a:rPr>
+              <a:t>ordem</a:t>
+            </a:r>
+            <a:r>
+              <a:rPr lang="en-US" dirty="0">
+                <a:latin typeface="Nunito" pitchFamily="2" charset="77"/>
+              </a:rPr>
+              <a:t> que </a:t>
+            </a:r>
+            <a:r>
+              <a:rPr lang="en-US" dirty="0" err="1">
+                <a:latin typeface="Nunito" pitchFamily="2" charset="77"/>
+              </a:rPr>
+              <a:t>chegam</a:t>
+            </a:r>
+            <a:r>
+              <a:rPr lang="en-US" dirty="0">
+                <a:latin typeface="Nunito" pitchFamily="2" charset="77"/>
+              </a:rPr>
+              <a:t> no </a:t>
+            </a:r>
+            <a:r>
+              <a:rPr lang="en-US" dirty="0" err="1">
+                <a:latin typeface="Nunito" pitchFamily="2" charset="77"/>
+              </a:rPr>
+              <a:t>sistema</a:t>
+            </a:r>
+            <a:endParaRPr lang="en-US" dirty="0">
+              <a:latin typeface="Nunito" pitchFamily="2" charset="77"/>
+            </a:endParaRPr>
+          </a:p>
+          <a:p>
+            <a:pPr marL="742950" lvl="1" indent="-285750">
+              <a:buFontTx/>
+              <a:buChar char="-"/>
+            </a:pPr>
+            <a:r>
+              <a:rPr lang="en-US" dirty="0" err="1">
+                <a:latin typeface="Nunito" pitchFamily="2" charset="77"/>
+              </a:rPr>
+              <a:t>Igual</a:t>
+            </a:r>
+            <a:r>
+              <a:rPr lang="en-US" dirty="0">
+                <a:latin typeface="Nunito" pitchFamily="2" charset="77"/>
+              </a:rPr>
+              <a:t> um streaming de video</a:t>
+            </a:r>
+          </a:p>
+          <a:p>
+            <a:pPr marL="285750" indent="-285750">
+              <a:buFontTx/>
+              <a:buChar char="-"/>
+            </a:pPr>
+            <a:r>
+              <a:rPr lang="en-US" dirty="0" err="1">
+                <a:latin typeface="Nunito" pitchFamily="2" charset="77"/>
+              </a:rPr>
+              <a:t>Processar</a:t>
+            </a:r>
+            <a:r>
+              <a:rPr lang="en-US" dirty="0">
+                <a:latin typeface="Nunito" pitchFamily="2" charset="77"/>
+              </a:rPr>
+              <a:t> as </a:t>
+            </a:r>
+            <a:r>
+              <a:rPr lang="en-US" dirty="0" err="1">
+                <a:latin typeface="Nunito" pitchFamily="2" charset="77"/>
+              </a:rPr>
+              <a:t>ações</a:t>
+            </a:r>
+            <a:r>
+              <a:rPr lang="en-US" dirty="0">
+                <a:latin typeface="Nunito" pitchFamily="2" charset="77"/>
+              </a:rPr>
+              <a:t> que </a:t>
+            </a:r>
+            <a:r>
+              <a:rPr lang="en-US" dirty="0" err="1">
+                <a:latin typeface="Nunito" pitchFamily="2" charset="77"/>
+              </a:rPr>
+              <a:t>acontecem</a:t>
+            </a:r>
+            <a:r>
+              <a:rPr lang="en-US" dirty="0">
+                <a:latin typeface="Nunito" pitchFamily="2" charset="77"/>
+              </a:rPr>
+              <a:t> no </a:t>
+            </a:r>
+            <a:r>
+              <a:rPr lang="en-US" dirty="0" err="1">
+                <a:latin typeface="Nunito" pitchFamily="2" charset="77"/>
+              </a:rPr>
+              <a:t>sistema</a:t>
+            </a:r>
+            <a:r>
+              <a:rPr lang="en-US" dirty="0">
+                <a:latin typeface="Nunito" pitchFamily="2" charset="77"/>
+              </a:rPr>
+              <a:t> </a:t>
+            </a:r>
+            <a:r>
+              <a:rPr lang="en-US" dirty="0" err="1">
+                <a:latin typeface="Nunito" pitchFamily="2" charset="77"/>
+              </a:rPr>
+              <a:t>em</a:t>
+            </a:r>
+            <a:r>
+              <a:rPr lang="en-US" dirty="0">
+                <a:latin typeface="Nunito" pitchFamily="2" charset="77"/>
+              </a:rPr>
+              <a:t> tempo real.</a:t>
+            </a:r>
+          </a:p>
+          <a:p>
+            <a:pPr marL="285750" indent="-285750">
+              <a:buFontTx/>
+              <a:buChar char="-"/>
+            </a:pPr>
+            <a:endParaRPr lang="en-US" dirty="0">
+              <a:latin typeface="Montserrat Light" panose="00000400000000000000" pitchFamily="2" charset="0"/>
+            </a:endParaRPr>
+          </a:p>
+          <a:p>
+            <a:pPr marL="285750" indent="-285750">
+              <a:buFontTx/>
+              <a:buChar char="-"/>
+            </a:pPr>
+            <a:endParaRPr lang="pt-BR" dirty="0">
+              <a:latin typeface="Montserrat Light" panose="00000400000000000000" pitchFamily="2" charset="0"/>
+            </a:endParaRPr>
+          </a:p>
+          <a:p>
+            <a:pPr marL="285750" indent="-285750">
+              <a:buFontTx/>
+              <a:buChar char="-"/>
+            </a:pPr>
+            <a:endParaRPr lang="pt-BR" dirty="0">
+              <a:latin typeface="Montserrat Light" panose="00000400000000000000" pitchFamily="2" charset="0"/>
+            </a:endParaRPr>
+          </a:p>
+        </p:txBody>
+      </p:sp>
+      <p:pic>
+        <p:nvPicPr>
+          <p:cNvPr id="3" name="Gráfico 2">
+            <a:extLst>
+              <a:ext uri="{FF2B5EF4-FFF2-40B4-BE49-F238E27FC236}">
+                <a16:creationId xmlns:a16="http://schemas.microsoft.com/office/drawing/2014/main" id="{CBA04222-E9A5-46A3-809E-82ED64A96098}"/>
+              </a:ext>
+            </a:extLst>
+          </p:cNvPr>
+          <p:cNvPicPr>
+            <a:picLocks noChangeAspect="1"/>
+          </p:cNvPicPr>
+          <p:nvPr/>
+        </p:nvPicPr>
+        <p:blipFill>
+          <a:blip r:embed="rId5">
+            <a:extLst>
+              <a:ext uri="{28A0092B-C50C-407E-A947-70E740481C1C}">
+                <a14:useLocalDpi xmlns:a14="http://schemas.microsoft.com/office/drawing/2010/main" val="0"/>
+              </a:ext>
+              <a:ext uri="{96DAC541-7B7A-43D3-8B79-37D633B846F1}">
+                <asvg:svgBlip xmlns:asvg="http://schemas.microsoft.com/office/drawing/2016/SVG/main" r:embed="rId6"/>
+              </a:ext>
+            </a:extLst>
+          </a:blip>
+          <a:stretch>
+            <a:fillRect/>
+          </a:stretch>
+        </p:blipFill>
+        <p:spPr>
+          <a:xfrm>
+            <a:off x="6012472" y="2719343"/>
+            <a:ext cx="5439300" cy="3275393"/>
+          </a:xfrm>
+          <a:prstGeom prst="rect">
+            <a:avLst/>
+          </a:prstGeom>
+        </p:spPr>
+      </p:pic>
+    </p:spTree>
+    <p:extLst>
+      <p:ext uri="{BB962C8B-B14F-4D97-AF65-F5344CB8AC3E}">
+        <p14:creationId xmlns:p14="http://schemas.microsoft.com/office/powerpoint/2010/main" val="1135574743"/>
+      </p:ext>
+    </p:extLst>
+  </p:cSld>
+  <p:clrMapOvr>
+    <a:masterClrMapping/>
+  </p:clrMapOvr>
+  <mc:AlternateContent xmlns:mc="http://schemas.openxmlformats.org/markup-compatibility/2006" xmlns:p159="http://schemas.microsoft.com/office/powerpoint/2015/09/main">
+    <mc:Choice Requires="p159">
+      <p:transition xmlns:p14="http://schemas.microsoft.com/office/powerpoint/2010/main" spd="slow" p14:dur="2000">
+        <p159:morph option="byObject"/>
+      </p:transition>
+    </mc:Choice>
+    <mc:Fallback xmlns="">
+      <p:transition spd="slow">
+        <p:fade/>
+      </p:transition>
+    </mc:Fallback>
+  </mc:AlternateContent>
+  <p:timing>
+    <p:tnLst>
+      <p:par>
+        <p:cTn id="1" dur="indefinite" restart="never" nodeType="tmRoot">
+          <p:childTnLst>
+            <p:seq concurrent="1" nextAc="seek">
+              <p:cTn id="2" dur="indefinite" nodeType="mainSeq">
+                <p:childTnLst>
+                  <p:par>
+                    <p:cTn id="3" fill="hold">
+                      <p:stCondLst>
+                        <p:cond delay="indefinite"/>
+                      </p:stCondLst>
+                      <p:childTnLst>
+                        <p:par>
+                          <p:cTn id="4" fill="hold">
+                            <p:stCondLst>
+                              <p:cond delay="0"/>
+                            </p:stCondLst>
+                            <p:childTnLst>
+                              <p:par>
+                                <p:cTn id="5" presetID="1" presetClass="entr" presetSubtype="0" fill="hold" grpId="0" nodeType="clickEffect">
+                                  <p:stCondLst>
+                                    <p:cond delay="0"/>
+                                  </p:stCondLst>
+                                  <p:childTnLst>
+                                    <p:set>
+                                      <p:cBhvr>
+                                        <p:cTn id="6" dur="1" fill="hold">
+                                          <p:stCondLst>
+                                            <p:cond delay="0"/>
+                                          </p:stCondLst>
+                                        </p:cTn>
+                                        <p:tgtEl>
+                                          <p:spTgt spid="8"/>
+                                        </p:tgtEl>
+                                        <p:attrNameLst>
+                                          <p:attrName>style.visibility</p:attrName>
+                                        </p:attrNameLst>
+                                      </p:cBhvr>
+                                      <p:to>
+                                        <p:strVal val="visible"/>
+                                      </p:to>
+                                    </p:set>
+                                  </p:childTnLst>
+                                </p:cTn>
+                              </p:par>
+                            </p:childTnLst>
+                          </p:cTn>
+                        </p:par>
+                      </p:childTnLst>
+                    </p:cTn>
+                  </p:par>
+                </p:childTnLst>
+              </p:cTn>
+              <p:prevCondLst>
+                <p:cond evt="onPrev" delay="0">
+                  <p:tgtEl>
+                    <p:sldTgt/>
+                  </p:tgtEl>
+                </p:cond>
+              </p:prevCondLst>
+              <p:nextCondLst>
+                <p:cond evt="onNext" delay="0">
+                  <p:tgtEl>
+                    <p:sldTgt/>
+                  </p:tgtEl>
+                </p:cond>
+              </p:nextCondLst>
+            </p:seq>
+          </p:childTnLst>
+        </p:cTn>
+      </p:par>
+    </p:tnLst>
+    <p:bldLst>
+      <p:bldP spid="8" grpId="0"/>
     </p:bldLst>
   </p:timing>
 </p:sld>
@@ -28011,6 +29349,401 @@
     <p:bldLst>
       <p:bldP spid="11" grpId="0"/>
       <p:bldP spid="12" grpId="0"/>
+    </p:bldLst>
+  </p:timing>
+</p:sld>
+</file>
+
+<file path=ppt/slides/slide40.xml><?xml version="1.0" encoding="utf-8"?>
+<p:sld xmlns:a="http://schemas.openxmlformats.org/drawingml/2006/main" xmlns:r="http://schemas.openxmlformats.org/officeDocument/2006/relationships" xmlns:p="http://schemas.openxmlformats.org/presentationml/2006/main">
+  <p:cSld>
+    <p:spTree>
+      <p:nvGrpSpPr>
+        <p:cNvPr id="1" name=""/>
+        <p:cNvGrpSpPr/>
+        <p:nvPr/>
+      </p:nvGrpSpPr>
+      <p:grpSpPr>
+        <a:xfrm>
+          <a:off x="0" y="0"/>
+          <a:ext cx="0" cy="0"/>
+          <a:chOff x="0" y="0"/>
+          <a:chExt cx="0" cy="0"/>
+        </a:xfrm>
+      </p:grpSpPr>
+      <p:pic>
+        <p:nvPicPr>
+          <p:cNvPr id="5" name="Espaço Reservado para Conteúdo 4">
+            <a:extLst>
+              <a:ext uri="{FF2B5EF4-FFF2-40B4-BE49-F238E27FC236}">
+                <a16:creationId xmlns:a16="http://schemas.microsoft.com/office/drawing/2014/main" id="{DEBCF998-65B9-41B2-A535-E5741DD64BE5}"/>
+              </a:ext>
+            </a:extLst>
+          </p:cNvPr>
+          <p:cNvPicPr>
+            <a:picLocks noGrp="1" noChangeAspect="1"/>
+          </p:cNvPicPr>
+          <p:nvPr>
+            <p:ph idx="1"/>
+          </p:nvPr>
+        </p:nvPicPr>
+        <p:blipFill>
+          <a:blip r:embed="rId2">
+            <a:extLst>
+              <a:ext uri="{28A0092B-C50C-407E-A947-70E740481C1C}">
+                <a14:useLocalDpi xmlns:a14="http://schemas.microsoft.com/office/drawing/2010/main" val="0"/>
+              </a:ext>
+            </a:extLst>
+          </a:blip>
+          <a:stretch>
+            <a:fillRect/>
+          </a:stretch>
+        </p:blipFill>
+        <p:spPr>
+          <a:xfrm>
+            <a:off x="-11088" y="1"/>
+            <a:ext cx="12203088" cy="6881654"/>
+          </a:xfrm>
+        </p:spPr>
+      </p:pic>
+      <p:sp>
+        <p:nvSpPr>
+          <p:cNvPr id="6" name="Título 1">
+            <a:extLst>
+              <a:ext uri="{FF2B5EF4-FFF2-40B4-BE49-F238E27FC236}">
+                <a16:creationId xmlns:a16="http://schemas.microsoft.com/office/drawing/2014/main" id="{EC993F68-2ABC-472C-9DAA-F49885B6553A}"/>
+              </a:ext>
+            </a:extLst>
+          </p:cNvPr>
+          <p:cNvSpPr>
+            <a:spLocks noGrp="1"/>
+          </p:cNvSpPr>
+          <p:nvPr>
+            <p:ph type="title"/>
+          </p:nvPr>
+        </p:nvSpPr>
+        <p:spPr>
+          <a:xfrm>
+            <a:off x="29290" y="2418011"/>
+            <a:ext cx="11358357" cy="2021978"/>
+          </a:xfrm>
+        </p:spPr>
+        <p:txBody>
+          <a:bodyPr>
+            <a:normAutofit/>
+          </a:bodyPr>
+          <a:lstStyle/>
+          <a:p>
+            <a:pPr algn="ctr"/>
+            <a:r>
+              <a:rPr lang="pt-BR" sz="7300" dirty="0">
+                <a:solidFill>
+                  <a:schemeClr val="bg1"/>
+                </a:solidFill>
+                <a:latin typeface="Nunito" pitchFamily="2" charset="77"/>
+              </a:rPr>
+              <a:t>Dúvidas?</a:t>
+            </a:r>
+            <a:endParaRPr lang="pt-BR" sz="5400" dirty="0">
+              <a:solidFill>
+                <a:schemeClr val="bg1"/>
+              </a:solidFill>
+              <a:latin typeface="Nunito" pitchFamily="2" charset="77"/>
+            </a:endParaRPr>
+          </a:p>
+        </p:txBody>
+      </p:sp>
+      <p:pic>
+        <p:nvPicPr>
+          <p:cNvPr id="4" name="Gráfico 3">
+            <a:extLst>
+              <a:ext uri="{FF2B5EF4-FFF2-40B4-BE49-F238E27FC236}">
+                <a16:creationId xmlns:a16="http://schemas.microsoft.com/office/drawing/2014/main" id="{30B2841D-7CA4-4E0E-8F46-4FA75875DD08}"/>
+              </a:ext>
+            </a:extLst>
+          </p:cNvPr>
+          <p:cNvPicPr>
+            <a:picLocks noChangeAspect="1"/>
+          </p:cNvPicPr>
+          <p:nvPr/>
+        </p:nvPicPr>
+        <p:blipFill>
+          <a:blip r:embed="rId3">
+            <a:extLst>
+              <a:ext uri="{28A0092B-C50C-407E-A947-70E740481C1C}">
+                <a14:useLocalDpi xmlns:a14="http://schemas.microsoft.com/office/drawing/2010/main" val="0"/>
+              </a:ext>
+              <a:ext uri="{96DAC541-7B7A-43D3-8B79-37D633B846F1}">
+                <asvg:svgBlip xmlns:asvg="http://schemas.microsoft.com/office/drawing/2016/SVG/main" r:embed="rId4"/>
+              </a:ext>
+            </a:extLst>
+          </a:blip>
+          <a:stretch>
+            <a:fillRect/>
+          </a:stretch>
+        </p:blipFill>
+        <p:spPr>
+          <a:xfrm>
+            <a:off x="8042728" y="2538248"/>
+            <a:ext cx="1285750" cy="1648398"/>
+          </a:xfrm>
+          <a:prstGeom prst="rect">
+            <a:avLst/>
+          </a:prstGeom>
+        </p:spPr>
+      </p:pic>
+      <p:sp>
+        <p:nvSpPr>
+          <p:cNvPr id="7" name="CaixaDeTexto 6">
+            <a:extLst>
+              <a:ext uri="{FF2B5EF4-FFF2-40B4-BE49-F238E27FC236}">
+                <a16:creationId xmlns:a16="http://schemas.microsoft.com/office/drawing/2014/main" id="{F156BB03-8A3B-4693-854F-02F1C8040212}"/>
+              </a:ext>
+            </a:extLst>
+          </p:cNvPr>
+          <p:cNvSpPr txBox="1"/>
+          <p:nvPr/>
+        </p:nvSpPr>
+        <p:spPr>
+          <a:xfrm>
+            <a:off x="3307223" y="3955813"/>
+            <a:ext cx="5052852" cy="400110"/>
+          </a:xfrm>
+          <a:prstGeom prst="rect">
+            <a:avLst/>
+          </a:prstGeom>
+          <a:noFill/>
+        </p:spPr>
+        <p:txBody>
+          <a:bodyPr wrap="square" rtlCol="0">
+            <a:spAutoFit/>
+          </a:bodyPr>
+          <a:lstStyle/>
+          <a:p>
+            <a:pPr algn="ctr"/>
+            <a:r>
+              <a:rPr lang="pt-BR" sz="2000" dirty="0" err="1">
+                <a:solidFill>
+                  <a:schemeClr val="bg1"/>
+                </a:solidFill>
+                <a:latin typeface="Nunito" pitchFamily="2" charset="77"/>
+              </a:rPr>
+              <a:t>https</a:t>
+            </a:r>
+            <a:r>
+              <a:rPr lang="pt-BR" sz="2000" dirty="0">
+                <a:solidFill>
+                  <a:schemeClr val="bg1"/>
+                </a:solidFill>
+                <a:latin typeface="Nunito" pitchFamily="2" charset="77"/>
+              </a:rPr>
+              <a:t>://</a:t>
+            </a:r>
+            <a:r>
+              <a:rPr lang="pt-BR" sz="2000" dirty="0" err="1">
+                <a:solidFill>
+                  <a:schemeClr val="bg1"/>
+                </a:solidFill>
+                <a:latin typeface="Nunito" pitchFamily="2" charset="77"/>
+              </a:rPr>
+              <a:t>balta.io</a:t>
+            </a:r>
+            <a:r>
+              <a:rPr lang="pt-BR" sz="2000" dirty="0">
+                <a:solidFill>
+                  <a:schemeClr val="bg1"/>
+                </a:solidFill>
+                <a:latin typeface="Nunito" pitchFamily="2" charset="77"/>
+              </a:rPr>
+              <a:t>/ajuda</a:t>
+            </a:r>
+          </a:p>
+        </p:txBody>
+      </p:sp>
+    </p:spTree>
+    <p:extLst>
+      <p:ext uri="{BB962C8B-B14F-4D97-AF65-F5344CB8AC3E}">
+        <p14:creationId xmlns:p14="http://schemas.microsoft.com/office/powerpoint/2010/main" val="797744895"/>
+      </p:ext>
+    </p:extLst>
+  </p:cSld>
+  <p:clrMapOvr>
+    <a:masterClrMapping/>
+  </p:clrMapOvr>
+  <mc:AlternateContent xmlns:mc="http://schemas.openxmlformats.org/markup-compatibility/2006" xmlns:p14="http://schemas.microsoft.com/office/powerpoint/2010/main">
+    <mc:Choice Requires="p14">
+      <p:transition spd="med" p14:dur="700">
+        <p:fade/>
+      </p:transition>
+    </mc:Choice>
+    <mc:Fallback xmlns="">
+      <p:transition spd="med">
+        <p:fade/>
+      </p:transition>
+    </mc:Fallback>
+  </mc:AlternateContent>
+  <p:timing>
+    <p:tnLst>
+      <p:par>
+        <p:cTn id="1" dur="indefinite" restart="never" nodeType="tmRoot">
+          <p:childTnLst>
+            <p:seq concurrent="1" nextAc="seek">
+              <p:cTn id="2" dur="indefinite" nodeType="mainSeq">
+                <p:childTnLst>
+                  <p:par>
+                    <p:cTn id="3" fill="hold">
+                      <p:stCondLst>
+                        <p:cond delay="indefinite"/>
+                        <p:cond evt="onBegin" delay="0">
+                          <p:tn val="2"/>
+                        </p:cond>
+                      </p:stCondLst>
+                      <p:childTnLst>
+                        <p:par>
+                          <p:cTn id="4" fill="hold">
+                            <p:stCondLst>
+                              <p:cond delay="0"/>
+                            </p:stCondLst>
+                            <p:childTnLst>
+                              <p:par>
+                                <p:cTn id="5" presetID="10" presetClass="entr" presetSubtype="0" fill="hold" grpId="0" nodeType="afterEffect">
+                                  <p:stCondLst>
+                                    <p:cond delay="0"/>
+                                  </p:stCondLst>
+                                  <p:childTnLst>
+                                    <p:set>
+                                      <p:cBhvr>
+                                        <p:cTn id="6" dur="1" fill="hold">
+                                          <p:stCondLst>
+                                            <p:cond delay="0"/>
+                                          </p:stCondLst>
+                                        </p:cTn>
+                                        <p:tgtEl>
+                                          <p:spTgt spid="6"/>
+                                        </p:tgtEl>
+                                        <p:attrNameLst>
+                                          <p:attrName>style.visibility</p:attrName>
+                                        </p:attrNameLst>
+                                      </p:cBhvr>
+                                      <p:to>
+                                        <p:strVal val="visible"/>
+                                      </p:to>
+                                    </p:set>
+                                    <p:animEffect transition="in" filter="fade">
+                                      <p:cBhvr>
+                                        <p:cTn id="7" dur="500"/>
+                                        <p:tgtEl>
+                                          <p:spTgt spid="6"/>
+                                        </p:tgtEl>
+                                      </p:cBhvr>
+                                    </p:animEffect>
+                                  </p:childTnLst>
+                                </p:cTn>
+                              </p:par>
+                            </p:childTnLst>
+                          </p:cTn>
+                        </p:par>
+                        <p:par>
+                          <p:cTn id="8" fill="hold">
+                            <p:stCondLst>
+                              <p:cond delay="500"/>
+                            </p:stCondLst>
+                            <p:childTnLst>
+                              <p:par>
+                                <p:cTn id="9" presetID="10" presetClass="entr" presetSubtype="0" fill="hold" nodeType="afterEffect">
+                                  <p:stCondLst>
+                                    <p:cond delay="0"/>
+                                  </p:stCondLst>
+                                  <p:childTnLst>
+                                    <p:set>
+                                      <p:cBhvr>
+                                        <p:cTn id="10" dur="1" fill="hold">
+                                          <p:stCondLst>
+                                            <p:cond delay="0"/>
+                                          </p:stCondLst>
+                                        </p:cTn>
+                                        <p:tgtEl>
+                                          <p:spTgt spid="4"/>
+                                        </p:tgtEl>
+                                        <p:attrNameLst>
+                                          <p:attrName>style.visibility</p:attrName>
+                                        </p:attrNameLst>
+                                      </p:cBhvr>
+                                      <p:to>
+                                        <p:strVal val="visible"/>
+                                      </p:to>
+                                    </p:set>
+                                    <p:animEffect transition="in" filter="fade">
+                                      <p:cBhvr>
+                                        <p:cTn id="11" dur="500"/>
+                                        <p:tgtEl>
+                                          <p:spTgt spid="4"/>
+                                        </p:tgtEl>
+                                      </p:cBhvr>
+                                    </p:animEffect>
+                                  </p:childTnLst>
+                                </p:cTn>
+                              </p:par>
+                            </p:childTnLst>
+                          </p:cTn>
+                        </p:par>
+                        <p:par>
+                          <p:cTn id="12" fill="hold">
+                            <p:stCondLst>
+                              <p:cond delay="1000"/>
+                            </p:stCondLst>
+                            <p:childTnLst>
+                              <p:par>
+                                <p:cTn id="13" presetID="42" presetClass="path" presetSubtype="0" repeatCount="indefinite" accel="50000" decel="50000" autoRev="1" fill="hold" nodeType="afterEffect">
+                                  <p:stCondLst>
+                                    <p:cond delay="0"/>
+                                  </p:stCondLst>
+                                  <p:childTnLst>
+                                    <p:animMotion origin="layout" path="M 2.08333E-7 2.22222E-6 L 0.00052 0.05208 " pathEditMode="relative" rAng="0" ptsTypes="AA">
+                                      <p:cBhvr>
+                                        <p:cTn id="14" dur="2000" fill="hold"/>
+                                        <p:tgtEl>
+                                          <p:spTgt spid="4"/>
+                                        </p:tgtEl>
+                                        <p:attrNameLst>
+                                          <p:attrName>ppt_x</p:attrName>
+                                          <p:attrName>ppt_y</p:attrName>
+                                        </p:attrNameLst>
+                                      </p:cBhvr>
+                                      <p:rCtr x="26" y="2593"/>
+                                    </p:animMotion>
+                                  </p:childTnLst>
+                                </p:cTn>
+                              </p:par>
+                            </p:childTnLst>
+                          </p:cTn>
+                        </p:par>
+                      </p:childTnLst>
+                    </p:cTn>
+                  </p:par>
+                </p:childTnLst>
+              </p:cTn>
+              <p:prevCondLst>
+                <p:cond evt="onPrev" delay="0">
+                  <p:tgtEl>
+                    <p:sldTgt/>
+                  </p:tgtEl>
+                </p:cond>
+              </p:prevCondLst>
+              <p:nextCondLst>
+                <p:cond evt="onNext" delay="0">
+                  <p:tgtEl>
+                    <p:sldTgt/>
+                  </p:tgtEl>
+                </p:cond>
+              </p:nextCondLst>
+            </p:seq>
+          </p:childTnLst>
+        </p:cTn>
+      </p:par>
+    </p:tnLst>
+    <p:bldLst>
+      <p:bldP spid="6" grpId="0"/>
     </p:bldLst>
   </p:timing>
 </p:sld>

</xml_diff>